<commit_message>
made some layout changes and added description for the inter agent communication
</commit_message>
<xml_diff>
--- a/GroupD_ProjectPresentation .pptx
+++ b/GroupD_ProjectPresentation .pptx
@@ -54,6 +54,9 @@
     <p:sldId id="311" r:id="rId48"/>
     <p:sldId id="340" r:id="rId49"/>
     <p:sldId id="341" r:id="rId50"/>
+    <p:sldId id="342" r:id="rId51"/>
+    <p:sldId id="343" r:id="rId52"/>
+    <p:sldId id="344" r:id="rId53"/>
   </p:sldIdLst>
   <p:sldSz cx="12192000" cy="6858000"/>
   <p:notesSz cx="6858000" cy="9144000"/>
@@ -8436,7 +8439,7 @@
           <a:p>
             <a:r>
               <a:rPr lang="en-CA" dirty="0"/>
-              <a:t>9. Use Cases : Clinic Agent</a:t>
+              <a:t>15. Use Cases : Clinic Agent</a:t>
             </a:r>
           </a:p>
         </p:txBody>
@@ -13126,7 +13129,7 @@
           <a:p>
             <a:r>
               <a:rPr lang="en-CA" dirty="0"/>
-              <a:t>9. Use Cases : Appointment Agent</a:t>
+              <a:t>Use Cases(contd.) : Appointment Agent</a:t>
             </a:r>
           </a:p>
         </p:txBody>
@@ -17001,7 +17004,7 @@
           <a:p>
             <a:r>
               <a:rPr lang="en-CA" dirty="0"/>
-              <a:t>10. Use Cases : Video Link Agent</a:t>
+              <a:t>Use Cases (contd.) : Video Link Agent</a:t>
             </a:r>
           </a:p>
         </p:txBody>
@@ -17045,7 +17048,7 @@
         </p:blipFill>
         <p:spPr>
           <a:xfrm>
-            <a:off x="1613943" y="1890984"/>
+            <a:off x="1539875" y="1876917"/>
             <a:ext cx="8772525" cy="2257425"/>
           </a:xfrm>
           <a:prstGeom prst="rect">
@@ -20624,7 +20627,11 @@
           <a:p>
             <a:r>
               <a:rPr lang="en-CA" dirty="0"/>
-              <a:t>11. Use Cases : PDF(Template) Agent</a:t>
+              <a:t> </a:t>
+            </a:r>
+            <a:r>
+              <a:rPr lang="en-CA" sz="3800" dirty="0"/>
+              <a:t>Use Cases (contd.) : PDF(Template) Agent</a:t>
             </a:r>
           </a:p>
         </p:txBody>
@@ -24183,7 +24190,7 @@
           <a:p>
             <a:r>
               <a:rPr lang="en-CA" dirty="0"/>
-              <a:t>11. Use Cases : Notification Agent</a:t>
+              <a:t>Use Cases (contd.) : Notification Agent</a:t>
             </a:r>
           </a:p>
         </p:txBody>
@@ -28090,7 +28097,7 @@
           <a:p>
             <a:r>
               <a:rPr lang="en-CA" dirty="0"/>
-              <a:t>Class Diagram : Agents</a:t>
+              <a:t>16. Class Diagram : Agents</a:t>
             </a:r>
           </a:p>
         </p:txBody>
@@ -28210,7 +28217,7 @@
           <a:p>
             <a:r>
               <a:rPr lang="en-CA" dirty="0"/>
-              <a:t>Data Specification : E-R Diagram</a:t>
+              <a:t>17. Data Specification : E-R Diagram</a:t>
             </a:r>
           </a:p>
         </p:txBody>
@@ -28330,7 +28337,7 @@
           <a:p>
             <a:r>
               <a:rPr lang="en-CA" dirty="0"/>
-              <a:t>Typical Data Definition</a:t>
+              <a:t>18. Typical Data Definition</a:t>
             </a:r>
           </a:p>
         </p:txBody>
@@ -38235,14 +38242,19 @@
             <p:ph type="title"/>
           </p:nvPr>
         </p:nvSpPr>
-        <p:spPr/>
+        <p:spPr>
+          <a:xfrm>
+            <a:off x="1422401" y="450166"/>
+            <a:ext cx="10502900" cy="953184"/>
+          </a:xfrm>
+        </p:spPr>
         <p:txBody>
           <a:bodyPr/>
           <a:lstStyle/>
           <a:p>
             <a:r>
-              <a:rPr lang="en-US"/>
-              <a:t>Video link Agent </a:t>
+              <a:rPr lang="en-US" dirty="0"/>
+              <a:t>19. Inter-Agent communication</a:t>
             </a:r>
           </a:p>
         </p:txBody>
@@ -38268,15 +38280,15 @@
           <a:lstStyle/>
           <a:p>
             <a:r>
-              <a:rPr lang="en-US"/>
-              <a:t>Input Parameters : Soap Request</a:t>
+              <a:rPr lang="en-US" dirty="0"/>
+              <a:t>Video link web-service : Input parameters</a:t>
             </a:r>
           </a:p>
           <a:p>
             <a:pPr marL="0" indent="0">
               <a:buNone/>
             </a:pPr>
-            <a:endParaRPr lang="en-US"/>
+            <a:endParaRPr lang="en-US" dirty="0"/>
           </a:p>
         </p:txBody>
       </p:sp>
@@ -38434,7 +38446,7 @@
                         <a:buNone/>
                       </a:pPr>
                       <a:r>
-                        <a:rPr lang="en-US">
+                        <a:rPr lang="en-US" dirty="0">
                           <a:solidFill>
                             <a:schemeClr val="bg1"/>
                           </a:solidFill>
@@ -38442,7 +38454,7 @@
                         <a:t> </a:t>
                       </a:r>
                       <a:r>
-                        <a:rPr lang="en-US">
+                        <a:rPr lang="en-US" dirty="0">
                           <a:solidFill>
                             <a:schemeClr val="tx1"/>
                           </a:solidFill>
@@ -38450,104 +38462,74 @@
                         <a:t> </a:t>
                       </a:r>
                       <a:r>
-                        <a:rPr lang="en-US" sz="1400" b="1">
+                        <a:rPr lang="en-US" sz="1400" b="1" dirty="0">
                           <a:solidFill>
                             <a:srgbClr val="002060"/>
                           </a:solidFill>
                           <a:latin typeface="Times New Roman Bold" panose="02020503050405090304" charset="0"/>
                           <a:cs typeface="Times New Roman Bold" panose="02020503050405090304" charset="0"/>
                         </a:rPr>
-                        <a:t>&lt;soapenv:Envelope xmlns:soapenv="http://schemas.xmlsoap.org/soap/envelope/" xmlns:eser="http://eservice/"&gt;</a:t>
-                      </a:r>
-                    </a:p>
-                    <a:p>
-                      <a:pPr>
-                        <a:buNone/>
-                      </a:pPr>
-                      <a:r>
-                        <a:rPr lang="en-US" sz="1400" b="1">
+                        <a:t>&lt;</a:t>
+                      </a:r>
+                      <a:r>
+                        <a:rPr lang="en-US" sz="1400" b="1" dirty="0" err="1">
                           <a:solidFill>
                             <a:srgbClr val="002060"/>
                           </a:solidFill>
                           <a:latin typeface="Times New Roman Bold" panose="02020503050405090304" charset="0"/>
                           <a:cs typeface="Times New Roman Bold" panose="02020503050405090304" charset="0"/>
                         </a:rPr>
-                        <a:t>   &lt;soapenv:Header/&gt;</a:t>
-                      </a:r>
-                    </a:p>
-                    <a:p>
-                      <a:pPr>
-                        <a:buNone/>
-                      </a:pPr>
-                      <a:r>
-                        <a:rPr lang="en-US" sz="1400" b="1">
+                        <a:t>soapenv:Envelope</a:t>
+                      </a:r>
+                      <a:r>
+                        <a:rPr lang="en-US" sz="1400" b="1" dirty="0">
                           <a:solidFill>
                             <a:srgbClr val="002060"/>
                           </a:solidFill>
                           <a:latin typeface="Times New Roman Bold" panose="02020503050405090304" charset="0"/>
                           <a:cs typeface="Times New Roman Bold" panose="02020503050405090304" charset="0"/>
                         </a:rPr>
-                        <a:t>   &lt;soapenv:Body&gt;</a:t>
-                      </a:r>
-                    </a:p>
-                    <a:p>
-                      <a:pPr>
-                        <a:buNone/>
-                      </a:pPr>
-                      <a:r>
-                        <a:rPr lang="en-US" sz="1400" b="1">
+                        <a:t> </a:t>
+                      </a:r>
+                      <a:r>
+                        <a:rPr lang="en-US" sz="1400" b="1" dirty="0" err="1">
                           <a:solidFill>
                             <a:srgbClr val="002060"/>
                           </a:solidFill>
                           <a:latin typeface="Times New Roman Bold" panose="02020503050405090304" charset="0"/>
                           <a:cs typeface="Times New Roman Bold" panose="02020503050405090304" charset="0"/>
                         </a:rPr>
-                        <a:t>      &lt;eser:getZoomLink&gt;</a:t>
-                      </a:r>
-                    </a:p>
-                    <a:p>
-                      <a:pPr>
-                        <a:buNone/>
-                      </a:pPr>
-                      <a:r>
-                        <a:rPr lang="en-US" sz="1400" b="1">
+                        <a:t>xmlns:soapenv</a:t>
+                      </a:r>
+                      <a:r>
+                        <a:rPr lang="en-US" sz="1400" b="1" dirty="0">
                           <a:solidFill>
                             <a:srgbClr val="002060"/>
                           </a:solidFill>
                           <a:latin typeface="Times New Roman Bold" panose="02020503050405090304" charset="0"/>
                           <a:cs typeface="Times New Roman Bold" panose="02020503050405090304" charset="0"/>
                         </a:rPr>
-                        <a:t>         &lt;arg0&gt;</a:t>
-                      </a:r>
-                    </a:p>
-                    <a:p>
-                      <a:pPr>
-                        <a:buNone/>
-                      </a:pPr>
-                      <a:r>
-                        <a:rPr lang="en-US" sz="1400" b="1">
+                        <a:t>="http://schemas.xmlsoap.org/soap/envelope/" </a:t>
+                      </a:r>
+                      <a:r>
+                        <a:rPr lang="en-US" sz="1400" b="1" dirty="0" err="1">
                           <a:solidFill>
                             <a:srgbClr val="002060"/>
                           </a:solidFill>
                           <a:latin typeface="Times New Roman Bold" panose="02020503050405090304" charset="0"/>
                           <a:cs typeface="Times New Roman Bold" panose="02020503050405090304" charset="0"/>
                         </a:rPr>
-                        <a:t>            &lt;surname&gt;Client Surname&lt;/surname&gt;</a:t>
-                      </a:r>
-                    </a:p>
-                    <a:p>
-                      <a:pPr>
-                        <a:buNone/>
-                      </a:pPr>
-                      <a:r>
-                        <a:rPr lang="en-US" sz="1400" b="1">
+                        <a:t>xmlns:eser</a:t>
+                      </a:r>
+                      <a:r>
+                        <a:rPr lang="en-US" sz="1400" b="1" dirty="0">
                           <a:solidFill>
                             <a:srgbClr val="002060"/>
                           </a:solidFill>
                           <a:latin typeface="Times New Roman Bold" panose="02020503050405090304" charset="0"/>
                           <a:cs typeface="Times New Roman Bold" panose="02020503050405090304" charset="0"/>
                         </a:rPr>
-                        <a:t>            &lt;username&gt;Client Name&lt;/username&gt;</a:t>
+                        <a:t>="http://eservice/"&gt;</a:t>
                       </a:r>
                     </a:p>
                     <a:p>
@@ -38555,44 +38537,34 @@
                         <a:buNone/>
                       </a:pPr>
                       <a:r>
-                        <a:rPr lang="en-US" sz="1400" b="1">
+                        <a:rPr lang="en-US" sz="1400" b="1" dirty="0">
                           <a:solidFill>
                             <a:srgbClr val="002060"/>
                           </a:solidFill>
                           <a:latin typeface="Times New Roman Bold" panose="02020503050405090304" charset="0"/>
                           <a:cs typeface="Times New Roman Bold" panose="02020503050405090304" charset="0"/>
                         </a:rPr>
-                        <a:t>         &lt;/arg0&gt;</a:t>
-                      </a:r>
-                    </a:p>
-                    <a:p>
-                      <a:pPr>
-                        <a:buNone/>
-                      </a:pPr>
-                      <a:r>
-                        <a:rPr lang="en-US" sz="1400" b="1">
+                        <a:t>   &lt;</a:t>
+                      </a:r>
+                      <a:r>
+                        <a:rPr lang="en-US" sz="1400" b="1" dirty="0" err="1">
                           <a:solidFill>
                             <a:srgbClr val="002060"/>
                           </a:solidFill>
                           <a:latin typeface="Times New Roman Bold" panose="02020503050405090304" charset="0"/>
                           <a:cs typeface="Times New Roman Bold" panose="02020503050405090304" charset="0"/>
                         </a:rPr>
-                        <a:t>      &lt;/eser:getZoomLink&gt;</a:t>
-                      </a:r>
-                    </a:p>
-                    <a:p>
-                      <a:pPr>
-                        <a:buNone/>
-                      </a:pPr>
-                      <a:r>
-                        <a:rPr lang="en-US" sz="1400" b="1">
+                        <a:t>soapenv:Header</a:t>
+                      </a:r>
+                      <a:r>
+                        <a:rPr lang="en-US" sz="1400" b="1" dirty="0">
                           <a:solidFill>
                             <a:srgbClr val="002060"/>
                           </a:solidFill>
                           <a:latin typeface="Times New Roman Bold" panose="02020503050405090304" charset="0"/>
                           <a:cs typeface="Times New Roman Bold" panose="02020503050405090304" charset="0"/>
                         </a:rPr>
-                        <a:t>   &lt;/soapenv:Body&gt;</a:t>
+                        <a:t>/&gt;</a:t>
                       </a:r>
                     </a:p>
                     <a:p>
@@ -38600,16 +38572,236 @@
                         <a:buNone/>
                       </a:pPr>
                       <a:r>
-                        <a:rPr lang="en-US" sz="1400" b="1">
+                        <a:rPr lang="en-US" sz="1400" b="1" dirty="0">
                           <a:solidFill>
                             <a:srgbClr val="002060"/>
                           </a:solidFill>
                           <a:latin typeface="Times New Roman Bold" panose="02020503050405090304" charset="0"/>
                           <a:cs typeface="Times New Roman Bold" panose="02020503050405090304" charset="0"/>
                         </a:rPr>
-                        <a:t>&lt;/soapenv:Envelope&gt;</a:t>
-                      </a:r>
-                      <a:endParaRPr lang="en-US" sz="1400" b="1">
+                        <a:t>   &lt;</a:t>
+                      </a:r>
+                      <a:r>
+                        <a:rPr lang="en-US" sz="1400" b="1" dirty="0" err="1">
+                          <a:solidFill>
+                            <a:srgbClr val="002060"/>
+                          </a:solidFill>
+                          <a:latin typeface="Times New Roman Bold" panose="02020503050405090304" charset="0"/>
+                          <a:cs typeface="Times New Roman Bold" panose="02020503050405090304" charset="0"/>
+                        </a:rPr>
+                        <a:t>soapenv:Body</a:t>
+                      </a:r>
+                      <a:r>
+                        <a:rPr lang="en-US" sz="1400" b="1" dirty="0">
+                          <a:solidFill>
+                            <a:srgbClr val="002060"/>
+                          </a:solidFill>
+                          <a:latin typeface="Times New Roman Bold" panose="02020503050405090304" charset="0"/>
+                          <a:cs typeface="Times New Roman Bold" panose="02020503050405090304" charset="0"/>
+                        </a:rPr>
+                        <a:t>&gt;</a:t>
+                      </a:r>
+                    </a:p>
+                    <a:p>
+                      <a:pPr>
+                        <a:buNone/>
+                      </a:pPr>
+                      <a:r>
+                        <a:rPr lang="en-US" sz="1400" b="1" dirty="0">
+                          <a:solidFill>
+                            <a:srgbClr val="002060"/>
+                          </a:solidFill>
+                          <a:latin typeface="Times New Roman Bold" panose="02020503050405090304" charset="0"/>
+                          <a:cs typeface="Times New Roman Bold" panose="02020503050405090304" charset="0"/>
+                        </a:rPr>
+                        <a:t>      &lt;</a:t>
+                      </a:r>
+                      <a:r>
+                        <a:rPr lang="en-US" sz="1400" b="1" dirty="0" err="1">
+                          <a:solidFill>
+                            <a:srgbClr val="002060"/>
+                          </a:solidFill>
+                          <a:latin typeface="Times New Roman Bold" panose="02020503050405090304" charset="0"/>
+                          <a:cs typeface="Times New Roman Bold" panose="02020503050405090304" charset="0"/>
+                        </a:rPr>
+                        <a:t>eser:getZoomLink</a:t>
+                      </a:r>
+                      <a:r>
+                        <a:rPr lang="en-US" sz="1400" b="1" dirty="0">
+                          <a:solidFill>
+                            <a:srgbClr val="002060"/>
+                          </a:solidFill>
+                          <a:latin typeface="Times New Roman Bold" panose="02020503050405090304" charset="0"/>
+                          <a:cs typeface="Times New Roman Bold" panose="02020503050405090304" charset="0"/>
+                        </a:rPr>
+                        <a:t>&gt;</a:t>
+                      </a:r>
+                    </a:p>
+                    <a:p>
+                      <a:pPr>
+                        <a:buNone/>
+                      </a:pPr>
+                      <a:r>
+                        <a:rPr lang="en-US" sz="1400" b="1" dirty="0">
+                          <a:solidFill>
+                            <a:srgbClr val="002060"/>
+                          </a:solidFill>
+                          <a:latin typeface="Times New Roman Bold" panose="02020503050405090304" charset="0"/>
+                          <a:cs typeface="Times New Roman Bold" panose="02020503050405090304" charset="0"/>
+                        </a:rPr>
+                        <a:t>         &lt;arg0&gt;</a:t>
+                      </a:r>
+                    </a:p>
+                    <a:p>
+                      <a:pPr>
+                        <a:buNone/>
+                      </a:pPr>
+                      <a:r>
+                        <a:rPr lang="en-US" sz="1400" b="1" dirty="0">
+                          <a:solidFill>
+                            <a:srgbClr val="002060"/>
+                          </a:solidFill>
+                          <a:latin typeface="Times New Roman Bold" panose="02020503050405090304" charset="0"/>
+                          <a:cs typeface="Times New Roman Bold" panose="02020503050405090304" charset="0"/>
+                        </a:rPr>
+                        <a:t>            &lt;surname&gt;Client Surname&lt;/surname&gt;</a:t>
+                      </a:r>
+                    </a:p>
+                    <a:p>
+                      <a:pPr>
+                        <a:buNone/>
+                      </a:pPr>
+                      <a:r>
+                        <a:rPr lang="en-US" sz="1400" b="1" dirty="0">
+                          <a:solidFill>
+                            <a:srgbClr val="002060"/>
+                          </a:solidFill>
+                          <a:latin typeface="Times New Roman Bold" panose="02020503050405090304" charset="0"/>
+                          <a:cs typeface="Times New Roman Bold" panose="02020503050405090304" charset="0"/>
+                        </a:rPr>
+                        <a:t>            &lt;username&gt;Client Name&lt;/username&gt;</a:t>
+                      </a:r>
+                    </a:p>
+                    <a:p>
+                      <a:pPr>
+                        <a:buNone/>
+                      </a:pPr>
+                      <a:r>
+                        <a:rPr lang="en-US" sz="1400" b="1" dirty="0">
+                          <a:solidFill>
+                            <a:srgbClr val="002060"/>
+                          </a:solidFill>
+                          <a:latin typeface="Times New Roman Bold" panose="02020503050405090304" charset="0"/>
+                          <a:cs typeface="Times New Roman Bold" panose="02020503050405090304" charset="0"/>
+                        </a:rPr>
+                        <a:t>         &lt;/arg0&gt;</a:t>
+                      </a:r>
+                    </a:p>
+                    <a:p>
+                      <a:pPr>
+                        <a:buNone/>
+                      </a:pPr>
+                      <a:r>
+                        <a:rPr lang="en-US" sz="1400" b="1" dirty="0">
+                          <a:solidFill>
+                            <a:srgbClr val="002060"/>
+                          </a:solidFill>
+                          <a:latin typeface="Times New Roman Bold" panose="02020503050405090304" charset="0"/>
+                          <a:cs typeface="Times New Roman Bold" panose="02020503050405090304" charset="0"/>
+                        </a:rPr>
+                        <a:t>      &lt;/</a:t>
+                      </a:r>
+                      <a:r>
+                        <a:rPr lang="en-US" sz="1400" b="1" dirty="0" err="1">
+                          <a:solidFill>
+                            <a:srgbClr val="002060"/>
+                          </a:solidFill>
+                          <a:latin typeface="Times New Roman Bold" panose="02020503050405090304" charset="0"/>
+                          <a:cs typeface="Times New Roman Bold" panose="02020503050405090304" charset="0"/>
+                        </a:rPr>
+                        <a:t>eser:getZoomLink</a:t>
+                      </a:r>
+                      <a:r>
+                        <a:rPr lang="en-US" sz="1400" b="1" dirty="0">
+                          <a:solidFill>
+                            <a:srgbClr val="002060"/>
+                          </a:solidFill>
+                          <a:latin typeface="Times New Roman Bold" panose="02020503050405090304" charset="0"/>
+                          <a:cs typeface="Times New Roman Bold" panose="02020503050405090304" charset="0"/>
+                        </a:rPr>
+                        <a:t>&gt;</a:t>
+                      </a:r>
+                    </a:p>
+                    <a:p>
+                      <a:pPr>
+                        <a:buNone/>
+                      </a:pPr>
+                      <a:r>
+                        <a:rPr lang="en-US" sz="1400" b="1" dirty="0">
+                          <a:solidFill>
+                            <a:srgbClr val="002060"/>
+                          </a:solidFill>
+                          <a:latin typeface="Times New Roman Bold" panose="02020503050405090304" charset="0"/>
+                          <a:cs typeface="Times New Roman Bold" panose="02020503050405090304" charset="0"/>
+                        </a:rPr>
+                        <a:t>   &lt;/</a:t>
+                      </a:r>
+                      <a:r>
+                        <a:rPr lang="en-US" sz="1400" b="1" dirty="0" err="1">
+                          <a:solidFill>
+                            <a:srgbClr val="002060"/>
+                          </a:solidFill>
+                          <a:latin typeface="Times New Roman Bold" panose="02020503050405090304" charset="0"/>
+                          <a:cs typeface="Times New Roman Bold" panose="02020503050405090304" charset="0"/>
+                        </a:rPr>
+                        <a:t>soapenv:Body</a:t>
+                      </a:r>
+                      <a:r>
+                        <a:rPr lang="en-US" sz="1400" b="1" dirty="0">
+                          <a:solidFill>
+                            <a:srgbClr val="002060"/>
+                          </a:solidFill>
+                          <a:latin typeface="Times New Roman Bold" panose="02020503050405090304" charset="0"/>
+                          <a:cs typeface="Times New Roman Bold" panose="02020503050405090304" charset="0"/>
+                        </a:rPr>
+                        <a:t>&gt;</a:t>
+                      </a:r>
+                    </a:p>
+                    <a:p>
+                      <a:pPr>
+                        <a:buNone/>
+                      </a:pPr>
+                      <a:r>
+                        <a:rPr lang="en-US" sz="1400" b="1" dirty="0">
+                          <a:solidFill>
+                            <a:srgbClr val="002060"/>
+                          </a:solidFill>
+                          <a:latin typeface="Times New Roman Bold" panose="02020503050405090304" charset="0"/>
+                          <a:cs typeface="Times New Roman Bold" panose="02020503050405090304" charset="0"/>
+                        </a:rPr>
+                        <a:t>&lt;/</a:t>
+                      </a:r>
+                      <a:r>
+                        <a:rPr lang="en-US" sz="1400" b="1" dirty="0" err="1">
+                          <a:solidFill>
+                            <a:srgbClr val="002060"/>
+                          </a:solidFill>
+                          <a:latin typeface="Times New Roman Bold" panose="02020503050405090304" charset="0"/>
+                          <a:cs typeface="Times New Roman Bold" panose="02020503050405090304" charset="0"/>
+                        </a:rPr>
+                        <a:t>soapenv:Envelope</a:t>
+                      </a:r>
+                      <a:r>
+                        <a:rPr lang="en-US" sz="1400" b="1" dirty="0">
+                          <a:solidFill>
+                            <a:srgbClr val="002060"/>
+                          </a:solidFill>
+                          <a:latin typeface="Times New Roman Bold" panose="02020503050405090304" charset="0"/>
+                          <a:cs typeface="Times New Roman Bold" panose="02020503050405090304" charset="0"/>
+                        </a:rPr>
+                        <a:t>&gt;</a:t>
+                      </a:r>
+                      <a:endParaRPr lang="en-US" sz="1400" b="1" dirty="0">
                         <a:solidFill>
                           <a:schemeClr val="bg1"/>
                         </a:solidFill>
@@ -38621,7 +38813,7 @@
                       <a:pPr>
                         <a:buNone/>
                       </a:pPr>
-                      <a:endParaRPr lang="en-US">
+                      <a:endParaRPr lang="en-US" dirty="0">
                         <a:solidFill>
                           <a:schemeClr val="bg1"/>
                         </a:solidFill>
@@ -38632,7 +38824,7 @@
                         <a:buNone/>
                       </a:pPr>
                       <a:r>
-                        <a:rPr lang="en-US">
+                        <a:rPr lang="en-US" dirty="0">
                           <a:solidFill>
                             <a:schemeClr val="bg1"/>
                           </a:solidFill>
@@ -38652,7 +38844,7 @@
                         <a:buNone/>
                       </a:pPr>
                       <a:r>
-                        <a:rPr lang="en-US"/>
+                        <a:rPr lang="en-US" dirty="0"/>
                         <a:t>Client information such as username and surname is sent in the request.</a:t>
                       </a:r>
                     </a:p>
@@ -38713,8 +38905,8 @@
           <a:lstStyle/>
           <a:p>
             <a:r>
-              <a:rPr lang="en-US"/>
-              <a:t>Video link Agent(contd)</a:t>
+              <a:rPr lang="en-US" dirty="0"/>
+              <a:t>Inter-Agent communication(contd.)</a:t>
             </a:r>
           </a:p>
         </p:txBody>
@@ -38735,12 +38927,8 @@
           <a:lstStyle/>
           <a:p>
             <a:r>
-              <a:rPr lang="en-US">
-                <a:solidFill>
-                  <a:schemeClr val="tx1"/>
-                </a:solidFill>
-              </a:rPr>
-              <a:t>Output Parameters : Soap Response</a:t>
+              <a:rPr lang="en-US" dirty="0"/>
+              <a:t>Video link web-service : Output parameters</a:t>
             </a:r>
           </a:p>
         </p:txBody>
@@ -38822,11 +39010,16 @@
             <p:custDataLst>
               <p:tags r:id="rId1"/>
             </p:custDataLst>
+            <p:extLst>
+              <p:ext uri="{D42A27DB-BD31-4B8C-83A1-F6EECF244321}">
+                <p14:modId xmlns:p14="http://schemas.microsoft.com/office/powerpoint/2010/main" val="3163380872"/>
+              </p:ext>
+            </p:extLst>
           </p:nvPr>
         </p:nvGraphicFramePr>
         <p:xfrm>
           <a:off x="1614170" y="2175510"/>
-          <a:ext cx="9169400" cy="3498850"/>
+          <a:ext cx="9169400" cy="3860800"/>
         </p:xfrm>
         <a:graphic>
           <a:graphicData uri="http://schemas.openxmlformats.org/drawingml/2006/table">
@@ -38899,14 +39092,14 @@
                         <a:buNone/>
                       </a:pPr>
                       <a:r>
-                        <a:rPr lang="en-US" sz="1400" b="1">
+                        <a:rPr lang="en-US" sz="1100" b="1" dirty="0">
                           <a:solidFill>
                             <a:srgbClr val="002060"/>
                           </a:solidFill>
                           <a:latin typeface="Times New Roman Bold" panose="02020503050405090304" charset="0"/>
                           <a:cs typeface="Times New Roman Bold" panose="02020503050405090304" charset="0"/>
                         </a:rPr>
-                        <a:t>&lt;S:Envelope xmlns:S="http://schemas.xmlsoap.org/soap/envelope/"&gt;</a:t>
+                        <a:t>Headers :-</a:t>
                       </a:r>
                     </a:p>
                     <a:p>
@@ -38914,14 +39107,14 @@
                         <a:buNone/>
                       </a:pPr>
                       <a:r>
-                        <a:rPr lang="en-US" sz="1400" b="1">
+                        <a:rPr lang="en-US" sz="1100" b="1" dirty="0">
                           <a:solidFill>
                             <a:srgbClr val="002060"/>
                           </a:solidFill>
                           <a:latin typeface="Times New Roman Bold" panose="02020503050405090304" charset="0"/>
                           <a:cs typeface="Times New Roman Bold" panose="02020503050405090304" charset="0"/>
                         </a:rPr>
-                        <a:t>   &lt;S:Body&gt;</a:t>
+                        <a:t>Content-type text/xml; charset=utf-8</a:t>
                       </a:r>
                     </a:p>
                     <a:p>
@@ -38929,14 +39122,14 @@
                         <a:buNone/>
                       </a:pPr>
                       <a:r>
-                        <a:rPr lang="en-US" sz="1400" b="1">
+                        <a:rPr lang="en-US" sz="1100" b="1" dirty="0">
                           <a:solidFill>
                             <a:srgbClr val="002060"/>
                           </a:solidFill>
                           <a:latin typeface="Times New Roman Bold" panose="02020503050405090304" charset="0"/>
                           <a:cs typeface="Times New Roman Bold" panose="02020503050405090304" charset="0"/>
                         </a:rPr>
-                        <a:t>      &lt;ns2:getZoomLinkResponse xmlns:ns2="http://eservice/"&gt;</a:t>
+                        <a:t>#status# HTTP/1.1 200 OK</a:t>
                       </a:r>
                     </a:p>
                     <a:p>
@@ -38944,14 +39137,14 @@
                         <a:buNone/>
                       </a:pPr>
                       <a:r>
-                        <a:rPr lang="en-US" sz="1400" b="1">
+                        <a:rPr lang="en-US" sz="1100" b="1" dirty="0">
                           <a:solidFill>
                             <a:srgbClr val="002060"/>
                           </a:solidFill>
                           <a:latin typeface="Times New Roman Bold" panose="02020503050405090304" charset="0"/>
                           <a:cs typeface="Times New Roman Bold" panose="02020503050405090304" charset="0"/>
                         </a:rPr>
-                        <a:t>         &lt;return&gt;</a:t>
+                        <a:t>Date Thu, 09 Dec 2021 22:40:22 GMT</a:t>
                       </a:r>
                     </a:p>
                     <a:p>
@@ -38959,89 +39152,81 @@
                         <a:buNone/>
                       </a:pPr>
                       <a:r>
-                        <a:rPr lang="en-US" sz="1400" b="1">
+                        <a:rPr lang="en-US" sz="1100" b="1" dirty="0">
                           <a:solidFill>
                             <a:srgbClr val="002060"/>
                           </a:solidFill>
                           <a:latin typeface="Times New Roman Bold" panose="02020503050405090304" charset="0"/>
                           <a:cs typeface="Times New Roman Bold" panose="02020503050405090304" charset="0"/>
                         </a:rPr>
-                        <a:t>            &lt;zoomLinkList&gt;</a:t>
+                        <a:t>Transfer-encoding chunked</a:t>
                       </a:r>
                     </a:p>
                     <a:p>
                       <a:pPr>
                         <a:buNone/>
                       </a:pPr>
-                      <a:r>
-                        <a:rPr lang="en-US" sz="1400" b="1">
+                      <a:endParaRPr lang="en-US" sz="1100" b="1" dirty="0">
+                        <a:solidFill>
+                          <a:srgbClr val="002060"/>
+                        </a:solidFill>
+                        <a:latin typeface="Times New Roman Bold" panose="02020503050405090304" charset="0"/>
+                        <a:cs typeface="Times New Roman Bold" panose="02020503050405090304" charset="0"/>
+                      </a:endParaRPr>
+                    </a:p>
+                    <a:p>
+                      <a:pPr>
+                        <a:buNone/>
+                      </a:pPr>
+                      <a:r>
+                        <a:rPr lang="en-US" sz="1100" b="1" dirty="0">
                           <a:solidFill>
                             <a:srgbClr val="002060"/>
                           </a:solidFill>
                           <a:latin typeface="Times New Roman Bold" panose="02020503050405090304" charset="0"/>
                           <a:cs typeface="Times New Roman Bold" panose="02020503050405090304" charset="0"/>
                         </a:rPr>
-                        <a:t>               &lt;meetingId&gt;424 588 1231&lt;/meetingId&gt;</a:t>
-                      </a:r>
-                    </a:p>
-                    <a:p>
-                      <a:pPr>
-                        <a:buNone/>
-                      </a:pPr>
-                      <a:r>
-                        <a:rPr lang="en-US" sz="1400" b="1">
+                        <a:t>&lt;</a:t>
+                      </a:r>
+                      <a:r>
+                        <a:rPr lang="en-US" sz="1100" b="1" dirty="0" err="1">
                           <a:solidFill>
                             <a:srgbClr val="002060"/>
                           </a:solidFill>
                           <a:latin typeface="Times New Roman Bold" panose="02020503050405090304" charset="0"/>
                           <a:cs typeface="Times New Roman Bold" panose="02020503050405090304" charset="0"/>
                         </a:rPr>
-                        <a:t>               &lt;password&gt;Engg696&lt;/password&gt;</a:t>
-                      </a:r>
-                    </a:p>
-                    <a:p>
-                      <a:pPr>
-                        <a:buNone/>
-                      </a:pPr>
-                      <a:r>
-                        <a:rPr lang="en-US" sz="1400" b="1">
+                        <a:t>S:Envelope</a:t>
+                      </a:r>
+                      <a:r>
+                        <a:rPr lang="en-US" sz="1100" b="1" dirty="0">
                           <a:solidFill>
                             <a:srgbClr val="002060"/>
                           </a:solidFill>
                           <a:latin typeface="Times New Roman Bold" panose="02020503050405090304" charset="0"/>
                           <a:cs typeface="Times New Roman Bold" panose="02020503050405090304" charset="0"/>
                         </a:rPr>
-                        <a:t>               &lt;url&gt;https://ucalgary.zoom.us/j/4245881231&lt;/url&gt;</a:t>
-                      </a:r>
-                    </a:p>
-                    <a:p>
-                      <a:pPr>
-                        <a:buNone/>
-                      </a:pPr>
-                      <a:r>
-                        <a:rPr lang="en-US" sz="1400" b="1">
+                        <a:t> </a:t>
+                      </a:r>
+                      <a:r>
+                        <a:rPr lang="en-US" sz="1100" b="1" dirty="0" err="1">
                           <a:solidFill>
                             <a:srgbClr val="002060"/>
                           </a:solidFill>
                           <a:latin typeface="Times New Roman Bold" panose="02020503050405090304" charset="0"/>
                           <a:cs typeface="Times New Roman Bold" panose="02020503050405090304" charset="0"/>
                         </a:rPr>
-                        <a:t>            &lt;/zoomLinkList&gt;</a:t>
-                      </a:r>
-                    </a:p>
-                    <a:p>
-                      <a:pPr>
-                        <a:buNone/>
-                      </a:pPr>
-                      <a:r>
-                        <a:rPr lang="en-US" sz="1400" b="1">
+                        <a:t>xmlns:S</a:t>
+                      </a:r>
+                      <a:r>
+                        <a:rPr lang="en-US" sz="1100" b="1" dirty="0">
                           <a:solidFill>
                             <a:srgbClr val="002060"/>
                           </a:solidFill>
                           <a:latin typeface="Times New Roman Bold" panose="02020503050405090304" charset="0"/>
                           <a:cs typeface="Times New Roman Bold" panose="02020503050405090304" charset="0"/>
                         </a:rPr>
-                        <a:t>         &lt;/return&gt;</a:t>
+                        <a:t>="http://schemas.xmlsoap.org/soap/envelope/"&gt;</a:t>
                       </a:r>
                     </a:p>
                     <a:p>
@@ -39049,47 +39234,332 @@
                         <a:buNone/>
                       </a:pPr>
                       <a:r>
-                        <a:rPr lang="en-US" sz="1400" b="1">
+                        <a:rPr lang="en-US" sz="1100" b="1" dirty="0">
                           <a:solidFill>
                             <a:srgbClr val="002060"/>
                           </a:solidFill>
                           <a:latin typeface="Times New Roman Bold" panose="02020503050405090304" charset="0"/>
                           <a:cs typeface="Times New Roman Bold" panose="02020503050405090304" charset="0"/>
                         </a:rPr>
-                        <a:t>      &lt;/ns2:getZoomLinkResponse&gt;</a:t>
-                      </a:r>
-                    </a:p>
-                    <a:p>
-                      <a:pPr>
-                        <a:buNone/>
-                      </a:pPr>
-                      <a:r>
-                        <a:rPr lang="en-US" sz="1400" b="1">
+                        <a:t>   &lt;</a:t>
+                      </a:r>
+                      <a:r>
+                        <a:rPr lang="en-US" sz="1100" b="1" dirty="0" err="1">
                           <a:solidFill>
                             <a:srgbClr val="002060"/>
                           </a:solidFill>
                           <a:latin typeface="Times New Roman Bold" panose="02020503050405090304" charset="0"/>
                           <a:cs typeface="Times New Roman Bold" panose="02020503050405090304" charset="0"/>
                         </a:rPr>
-                        <a:t>   &lt;/S:Body&gt;</a:t>
-                      </a:r>
-                    </a:p>
-                    <a:p>
-                      <a:pPr>
-                        <a:buNone/>
-                      </a:pPr>
-                      <a:r>
-                        <a:rPr lang="en-US" sz="1400" b="1">
+                        <a:t>S:Body</a:t>
+                      </a:r>
+                      <a:r>
+                        <a:rPr lang="en-US" sz="1100" b="1" dirty="0">
                           <a:solidFill>
                             <a:srgbClr val="002060"/>
                           </a:solidFill>
                           <a:latin typeface="Times New Roman Bold" panose="02020503050405090304" charset="0"/>
                           <a:cs typeface="Times New Roman Bold" panose="02020503050405090304" charset="0"/>
                         </a:rPr>
-                        <a:t>&lt;/S:Envelope</a:t>
-                      </a:r>
-                      <a:r>
-                        <a:rPr lang="en-US" sz="1400" b="1">
+                        <a:t>&gt;</a:t>
+                      </a:r>
+                    </a:p>
+                    <a:p>
+                      <a:pPr>
+                        <a:buNone/>
+                      </a:pPr>
+                      <a:r>
+                        <a:rPr lang="en-US" sz="1100" b="1" dirty="0">
+                          <a:solidFill>
+                            <a:srgbClr val="002060"/>
+                          </a:solidFill>
+                          <a:latin typeface="Times New Roman Bold" panose="02020503050405090304" charset="0"/>
+                          <a:cs typeface="Times New Roman Bold" panose="02020503050405090304" charset="0"/>
+                        </a:rPr>
+                        <a:t>      &lt;ns2:getZoomLinkResponse xmlns:ns2="http://eservice/"&gt;</a:t>
+                      </a:r>
+                    </a:p>
+                    <a:p>
+                      <a:pPr>
+                        <a:buNone/>
+                      </a:pPr>
+                      <a:r>
+                        <a:rPr lang="en-US" sz="1100" b="1" dirty="0">
+                          <a:solidFill>
+                            <a:srgbClr val="002060"/>
+                          </a:solidFill>
+                          <a:latin typeface="Times New Roman Bold" panose="02020503050405090304" charset="0"/>
+                          <a:cs typeface="Times New Roman Bold" panose="02020503050405090304" charset="0"/>
+                        </a:rPr>
+                        <a:t>         &lt;return&gt;</a:t>
+                      </a:r>
+                    </a:p>
+                    <a:p>
+                      <a:pPr>
+                        <a:buNone/>
+                      </a:pPr>
+                      <a:r>
+                        <a:rPr lang="en-US" sz="1100" b="1" dirty="0">
+                          <a:solidFill>
+                            <a:srgbClr val="002060"/>
+                          </a:solidFill>
+                          <a:latin typeface="Times New Roman Bold" panose="02020503050405090304" charset="0"/>
+                          <a:cs typeface="Times New Roman Bold" panose="02020503050405090304" charset="0"/>
+                        </a:rPr>
+                        <a:t>            &lt;</a:t>
+                      </a:r>
+                      <a:r>
+                        <a:rPr lang="en-US" sz="1100" b="1" dirty="0" err="1">
+                          <a:solidFill>
+                            <a:srgbClr val="002060"/>
+                          </a:solidFill>
+                          <a:latin typeface="Times New Roman Bold" panose="02020503050405090304" charset="0"/>
+                          <a:cs typeface="Times New Roman Bold" panose="02020503050405090304" charset="0"/>
+                        </a:rPr>
+                        <a:t>zoomLinkList</a:t>
+                      </a:r>
+                      <a:r>
+                        <a:rPr lang="en-US" sz="1100" b="1" dirty="0">
+                          <a:solidFill>
+                            <a:srgbClr val="002060"/>
+                          </a:solidFill>
+                          <a:latin typeface="Times New Roman Bold" panose="02020503050405090304" charset="0"/>
+                          <a:cs typeface="Times New Roman Bold" panose="02020503050405090304" charset="0"/>
+                        </a:rPr>
+                        <a:t>&gt;</a:t>
+                      </a:r>
+                    </a:p>
+                    <a:p>
+                      <a:pPr>
+                        <a:buNone/>
+                      </a:pPr>
+                      <a:r>
+                        <a:rPr lang="en-US" sz="1100" b="1" dirty="0">
+                          <a:solidFill>
+                            <a:srgbClr val="002060"/>
+                          </a:solidFill>
+                          <a:latin typeface="Times New Roman Bold" panose="02020503050405090304" charset="0"/>
+                          <a:cs typeface="Times New Roman Bold" panose="02020503050405090304" charset="0"/>
+                        </a:rPr>
+                        <a:t>               &lt;</a:t>
+                      </a:r>
+                      <a:r>
+                        <a:rPr lang="en-US" sz="1100" b="1" dirty="0" err="1">
+                          <a:solidFill>
+                            <a:srgbClr val="002060"/>
+                          </a:solidFill>
+                          <a:latin typeface="Times New Roman Bold" panose="02020503050405090304" charset="0"/>
+                          <a:cs typeface="Times New Roman Bold" panose="02020503050405090304" charset="0"/>
+                        </a:rPr>
+                        <a:t>meetingId</a:t>
+                      </a:r>
+                      <a:r>
+                        <a:rPr lang="en-US" sz="1100" b="1" dirty="0">
+                          <a:solidFill>
+                            <a:srgbClr val="002060"/>
+                          </a:solidFill>
+                          <a:latin typeface="Times New Roman Bold" panose="02020503050405090304" charset="0"/>
+                          <a:cs typeface="Times New Roman Bold" panose="02020503050405090304" charset="0"/>
+                        </a:rPr>
+                        <a:t>&gt;424 588 1231&lt;/</a:t>
+                      </a:r>
+                      <a:r>
+                        <a:rPr lang="en-US" sz="1100" b="1" dirty="0" err="1">
+                          <a:solidFill>
+                            <a:srgbClr val="002060"/>
+                          </a:solidFill>
+                          <a:latin typeface="Times New Roman Bold" panose="02020503050405090304" charset="0"/>
+                          <a:cs typeface="Times New Roman Bold" panose="02020503050405090304" charset="0"/>
+                        </a:rPr>
+                        <a:t>meetingId</a:t>
+                      </a:r>
+                      <a:r>
+                        <a:rPr lang="en-US" sz="1100" b="1" dirty="0">
+                          <a:solidFill>
+                            <a:srgbClr val="002060"/>
+                          </a:solidFill>
+                          <a:latin typeface="Times New Roman Bold" panose="02020503050405090304" charset="0"/>
+                          <a:cs typeface="Times New Roman Bold" panose="02020503050405090304" charset="0"/>
+                        </a:rPr>
+                        <a:t>&gt;</a:t>
+                      </a:r>
+                    </a:p>
+                    <a:p>
+                      <a:pPr>
+                        <a:buNone/>
+                      </a:pPr>
+                      <a:r>
+                        <a:rPr lang="en-US" sz="1100" b="1" dirty="0">
+                          <a:solidFill>
+                            <a:srgbClr val="002060"/>
+                          </a:solidFill>
+                          <a:latin typeface="Times New Roman Bold" panose="02020503050405090304" charset="0"/>
+                          <a:cs typeface="Times New Roman Bold" panose="02020503050405090304" charset="0"/>
+                        </a:rPr>
+                        <a:t>               &lt;password&gt;Engg696&lt;/password&gt;</a:t>
+                      </a:r>
+                    </a:p>
+                    <a:p>
+                      <a:pPr>
+                        <a:buNone/>
+                      </a:pPr>
+                      <a:r>
+                        <a:rPr lang="en-US" sz="1100" b="1" dirty="0">
+                          <a:solidFill>
+                            <a:srgbClr val="002060"/>
+                          </a:solidFill>
+                          <a:latin typeface="Times New Roman Bold" panose="02020503050405090304" charset="0"/>
+                          <a:cs typeface="Times New Roman Bold" panose="02020503050405090304" charset="0"/>
+                        </a:rPr>
+                        <a:t>               &lt;</a:t>
+                      </a:r>
+                      <a:r>
+                        <a:rPr lang="en-US" sz="1100" b="1" dirty="0" err="1">
+                          <a:solidFill>
+                            <a:srgbClr val="002060"/>
+                          </a:solidFill>
+                          <a:latin typeface="Times New Roman Bold" panose="02020503050405090304" charset="0"/>
+                          <a:cs typeface="Times New Roman Bold" panose="02020503050405090304" charset="0"/>
+                        </a:rPr>
+                        <a:t>url</a:t>
+                      </a:r>
+                      <a:r>
+                        <a:rPr lang="en-US" sz="1100" b="1" dirty="0">
+                          <a:solidFill>
+                            <a:srgbClr val="002060"/>
+                          </a:solidFill>
+                          <a:latin typeface="Times New Roman Bold" panose="02020503050405090304" charset="0"/>
+                          <a:cs typeface="Times New Roman Bold" panose="02020503050405090304" charset="0"/>
+                        </a:rPr>
+                        <a:t>&gt;https://ucalgary.zoom.us/j/4245881231&lt;/url&gt;</a:t>
+                      </a:r>
+                    </a:p>
+                    <a:p>
+                      <a:pPr>
+                        <a:buNone/>
+                      </a:pPr>
+                      <a:r>
+                        <a:rPr lang="en-US" sz="1100" b="1" dirty="0">
+                          <a:solidFill>
+                            <a:srgbClr val="002060"/>
+                          </a:solidFill>
+                          <a:latin typeface="Times New Roman Bold" panose="02020503050405090304" charset="0"/>
+                          <a:cs typeface="Times New Roman Bold" panose="02020503050405090304" charset="0"/>
+                        </a:rPr>
+                        <a:t>            &lt;/</a:t>
+                      </a:r>
+                      <a:r>
+                        <a:rPr lang="en-US" sz="1100" b="1" dirty="0" err="1">
+                          <a:solidFill>
+                            <a:srgbClr val="002060"/>
+                          </a:solidFill>
+                          <a:latin typeface="Times New Roman Bold" panose="02020503050405090304" charset="0"/>
+                          <a:cs typeface="Times New Roman Bold" panose="02020503050405090304" charset="0"/>
+                        </a:rPr>
+                        <a:t>zoomLinkList</a:t>
+                      </a:r>
+                      <a:r>
+                        <a:rPr lang="en-US" sz="1100" b="1" dirty="0">
+                          <a:solidFill>
+                            <a:srgbClr val="002060"/>
+                          </a:solidFill>
+                          <a:latin typeface="Times New Roman Bold" panose="02020503050405090304" charset="0"/>
+                          <a:cs typeface="Times New Roman Bold" panose="02020503050405090304" charset="0"/>
+                        </a:rPr>
+                        <a:t>&gt;</a:t>
+                      </a:r>
+                    </a:p>
+                    <a:p>
+                      <a:pPr>
+                        <a:buNone/>
+                      </a:pPr>
+                      <a:r>
+                        <a:rPr lang="en-US" sz="1100" b="1" dirty="0">
+                          <a:solidFill>
+                            <a:srgbClr val="002060"/>
+                          </a:solidFill>
+                          <a:latin typeface="Times New Roman Bold" panose="02020503050405090304" charset="0"/>
+                          <a:cs typeface="Times New Roman Bold" panose="02020503050405090304" charset="0"/>
+                        </a:rPr>
+                        <a:t>         &lt;/return&gt;</a:t>
+                      </a:r>
+                    </a:p>
+                    <a:p>
+                      <a:pPr>
+                        <a:buNone/>
+                      </a:pPr>
+                      <a:r>
+                        <a:rPr lang="en-US" sz="1100" b="1" dirty="0">
+                          <a:solidFill>
+                            <a:srgbClr val="002060"/>
+                          </a:solidFill>
+                          <a:latin typeface="Times New Roman Bold" panose="02020503050405090304" charset="0"/>
+                          <a:cs typeface="Times New Roman Bold" panose="02020503050405090304" charset="0"/>
+                        </a:rPr>
+                        <a:t>      &lt;/ns2:getZoomLinkResponse&gt;</a:t>
+                      </a:r>
+                    </a:p>
+                    <a:p>
+                      <a:pPr>
+                        <a:buNone/>
+                      </a:pPr>
+                      <a:r>
+                        <a:rPr lang="en-US" sz="1100" b="1" dirty="0">
+                          <a:solidFill>
+                            <a:srgbClr val="002060"/>
+                          </a:solidFill>
+                          <a:latin typeface="Times New Roman Bold" panose="02020503050405090304" charset="0"/>
+                          <a:cs typeface="Times New Roman Bold" panose="02020503050405090304" charset="0"/>
+                        </a:rPr>
+                        <a:t>   &lt;/</a:t>
+                      </a:r>
+                      <a:r>
+                        <a:rPr lang="en-US" sz="1100" b="1" dirty="0" err="1">
+                          <a:solidFill>
+                            <a:srgbClr val="002060"/>
+                          </a:solidFill>
+                          <a:latin typeface="Times New Roman Bold" panose="02020503050405090304" charset="0"/>
+                          <a:cs typeface="Times New Roman Bold" panose="02020503050405090304" charset="0"/>
+                        </a:rPr>
+                        <a:t>S:Body</a:t>
+                      </a:r>
+                      <a:r>
+                        <a:rPr lang="en-US" sz="1100" b="1" dirty="0">
+                          <a:solidFill>
+                            <a:srgbClr val="002060"/>
+                          </a:solidFill>
+                          <a:latin typeface="Times New Roman Bold" panose="02020503050405090304" charset="0"/>
+                          <a:cs typeface="Times New Roman Bold" panose="02020503050405090304" charset="0"/>
+                        </a:rPr>
+                        <a:t>&gt;</a:t>
+                      </a:r>
+                    </a:p>
+                    <a:p>
+                      <a:pPr>
+                        <a:buNone/>
+                      </a:pPr>
+                      <a:r>
+                        <a:rPr lang="en-US" sz="1100" b="1" dirty="0">
+                          <a:solidFill>
+                            <a:srgbClr val="002060"/>
+                          </a:solidFill>
+                          <a:latin typeface="Times New Roman Bold" panose="02020503050405090304" charset="0"/>
+                          <a:cs typeface="Times New Roman Bold" panose="02020503050405090304" charset="0"/>
+                        </a:rPr>
+                        <a:t>&lt;/</a:t>
+                      </a:r>
+                      <a:r>
+                        <a:rPr lang="en-US" sz="1100" b="1" dirty="0" err="1">
+                          <a:solidFill>
+                            <a:srgbClr val="002060"/>
+                          </a:solidFill>
+                          <a:latin typeface="Times New Roman Bold" panose="02020503050405090304" charset="0"/>
+                          <a:cs typeface="Times New Roman Bold" panose="02020503050405090304" charset="0"/>
+                        </a:rPr>
+                        <a:t>S:Envelope</a:t>
+                      </a:r>
+                      <a:r>
+                        <a:rPr lang="en-US" sz="1100" b="1" dirty="0">
                           <a:solidFill>
                             <a:schemeClr val="tx1"/>
                           </a:solidFill>
@@ -39111,8 +39581,8 @@
                         <a:buNone/>
                       </a:pPr>
                       <a:r>
-                        <a:rPr lang="en-US" sz="1600"/>
-                        <a:t>Meeting details such as the meetting id, password and the video link is recieved ed as the                                                     </a:t>
+                        <a:rPr lang="en-US" sz="1600" dirty="0"/>
+                        <a:t>Meeting details such as the meeting id, password and the video link is received.                                                     </a:t>
                       </a:r>
                     </a:p>
                   </a:txBody>
@@ -39294,6 +39764,1890 @@
         </p:txBody>
       </p:sp>
     </p:spTree>
+  </p:cSld>
+  <p:clrMapOvr>
+    <a:masterClrMapping/>
+  </p:clrMapOvr>
+  <p:transition>
+    <p:dissolve/>
+  </p:transition>
+</p:sld>
+</file>
+
+<file path=ppt/slides/slide50.xml><?xml version="1.0" encoding="utf-8"?>
+<p:sld xmlns:a="http://schemas.openxmlformats.org/drawingml/2006/main" xmlns:r="http://schemas.openxmlformats.org/officeDocument/2006/relationships" xmlns:p="http://schemas.openxmlformats.org/presentationml/2006/main">
+  <p:cSld>
+    <p:spTree>
+      <p:nvGrpSpPr>
+        <p:cNvPr id="1" name=""/>
+        <p:cNvGrpSpPr/>
+        <p:nvPr/>
+      </p:nvGrpSpPr>
+      <p:grpSpPr>
+        <a:xfrm>
+          <a:off x="0" y="0"/>
+          <a:ext cx="0" cy="0"/>
+          <a:chOff x="0" y="0"/>
+          <a:chExt cx="0" cy="0"/>
+        </a:xfrm>
+      </p:grpSpPr>
+      <p:sp>
+        <p:nvSpPr>
+          <p:cNvPr id="2" name="Title 1"/>
+          <p:cNvSpPr>
+            <a:spLocks noGrp="1"/>
+          </p:cNvSpPr>
+          <p:nvPr>
+            <p:ph type="title"/>
+          </p:nvPr>
+        </p:nvSpPr>
+        <p:spPr/>
+        <p:txBody>
+          <a:bodyPr/>
+          <a:lstStyle/>
+          <a:p>
+            <a:r>
+              <a:rPr lang="en-US" dirty="0"/>
+              <a:t>Inter-Agent communication(contd.)</a:t>
+            </a:r>
+          </a:p>
+        </p:txBody>
+      </p:sp>
+      <p:sp>
+        <p:nvSpPr>
+          <p:cNvPr id="3" name="Content Placeholder 2"/>
+          <p:cNvSpPr>
+            <a:spLocks noGrp="1"/>
+          </p:cNvSpPr>
+          <p:nvPr>
+            <p:ph idx="1"/>
+          </p:nvPr>
+        </p:nvSpPr>
+        <p:spPr/>
+        <p:txBody>
+          <a:bodyPr/>
+          <a:lstStyle/>
+          <a:p>
+            <a:r>
+              <a:rPr lang="en-US" dirty="0"/>
+              <a:t>Twilio Rest-API : Input parameters</a:t>
+            </a:r>
+          </a:p>
+        </p:txBody>
+      </p:sp>
+      <p:sp>
+        <p:nvSpPr>
+          <p:cNvPr id="4" name="Date Placeholder 3"/>
+          <p:cNvSpPr>
+            <a:spLocks noGrp="1"/>
+          </p:cNvSpPr>
+          <p:nvPr>
+            <p:ph type="dt" sz="half" idx="10"/>
+          </p:nvPr>
+        </p:nvSpPr>
+        <p:spPr/>
+        <p:txBody>
+          <a:bodyPr/>
+          <a:lstStyle/>
+          <a:p>
+            <a:r>
+              <a:rPr lang="en-US"/>
+              <a:t>SENG697 (Fall 2007)</a:t>
+            </a:r>
+            <a:endParaRPr lang="en-US" altLang="ja-JP"/>
+          </a:p>
+        </p:txBody>
+      </p:sp>
+      <p:sp>
+        <p:nvSpPr>
+          <p:cNvPr id="5" name="Footer Placeholder 4"/>
+          <p:cNvSpPr>
+            <a:spLocks noGrp="1"/>
+          </p:cNvSpPr>
+          <p:nvPr>
+            <p:ph type="ftr" sz="quarter" idx="11"/>
+          </p:nvPr>
+        </p:nvSpPr>
+        <p:spPr/>
+        <p:txBody>
+          <a:bodyPr/>
+          <a:lstStyle/>
+          <a:p>
+            <a:r>
+              <a:rPr lang="ja-JP" altLang="en-US"/>
+              <a:t>far@ucalgary.ca</a:t>
+            </a:r>
+            <a:endParaRPr lang="en-US" altLang="ja-JP"/>
+          </a:p>
+        </p:txBody>
+      </p:sp>
+      <p:sp>
+        <p:nvSpPr>
+          <p:cNvPr id="6" name="Slide Number Placeholder 5"/>
+          <p:cNvSpPr>
+            <a:spLocks noGrp="1"/>
+          </p:cNvSpPr>
+          <p:nvPr>
+            <p:ph type="sldNum" sz="quarter" idx="12"/>
+          </p:nvPr>
+        </p:nvSpPr>
+        <p:spPr/>
+        <p:txBody>
+          <a:bodyPr/>
+          <a:lstStyle/>
+          <a:p>
+            <a:fld id="{A4BAB868-1E00-44C6-B1AB-DFCC5F9865BA}" type="slidenum">
+              <a:rPr lang="ja-JP" altLang="en-US"/>
+              <a:t>50</a:t>
+            </a:fld>
+            <a:endParaRPr lang="en-US" altLang="ja-JP"/>
+          </a:p>
+        </p:txBody>
+      </p:sp>
+      <p:graphicFrame>
+        <p:nvGraphicFramePr>
+          <p:cNvPr id="7" name="Table 6"/>
+          <p:cNvGraphicFramePr/>
+          <p:nvPr>
+            <p:custDataLst>
+              <p:tags r:id="rId1"/>
+            </p:custDataLst>
+            <p:extLst>
+              <p:ext uri="{D42A27DB-BD31-4B8C-83A1-F6EECF244321}">
+                <p14:modId xmlns:p14="http://schemas.microsoft.com/office/powerpoint/2010/main" val="1059633709"/>
+              </p:ext>
+            </p:extLst>
+          </p:nvPr>
+        </p:nvGraphicFramePr>
+        <p:xfrm>
+          <a:off x="1614170" y="2175509"/>
+          <a:ext cx="9169400" cy="3917315"/>
+        </p:xfrm>
+        <a:graphic>
+          <a:graphicData uri="http://schemas.openxmlformats.org/drawingml/2006/table">
+            <a:tbl>
+              <a:tblPr firstRow="1" bandRow="1">
+                <a:tableStyleId>{5C22544A-7EE6-4342-B048-85BDC9FD1C3A}</a:tableStyleId>
+              </a:tblPr>
+              <a:tblGrid>
+                <a:gridCol w="6842125">
+                  <a:extLst>
+                    <a:ext uri="{9D8B030D-6E8A-4147-A177-3AD203B41FA5}">
+                      <a16:colId xmlns:a16="http://schemas.microsoft.com/office/drawing/2014/main" val="20000"/>
+                    </a:ext>
+                  </a:extLst>
+                </a:gridCol>
+                <a:gridCol w="2327275">
+                  <a:extLst>
+                    <a:ext uri="{9D8B030D-6E8A-4147-A177-3AD203B41FA5}">
+                      <a16:colId xmlns:a16="http://schemas.microsoft.com/office/drawing/2014/main" val="20001"/>
+                    </a:ext>
+                  </a:extLst>
+                </a:gridCol>
+              </a:tblGrid>
+              <a:tr h="635390">
+                <a:tc>
+                  <a:txBody>
+                    <a:bodyPr/>
+                    <a:lstStyle/>
+                    <a:p>
+                      <a:pPr>
+                        <a:buNone/>
+                      </a:pPr>
+                      <a:r>
+                        <a:rPr lang="en-US" sz="2400"/>
+                        <a:t>Parameters</a:t>
+                      </a:r>
+                    </a:p>
+                  </a:txBody>
+                  <a:tcPr/>
+                </a:tc>
+                <a:tc>
+                  <a:txBody>
+                    <a:bodyPr/>
+                    <a:lstStyle/>
+                    <a:p>
+                      <a:pPr>
+                        <a:buNone/>
+                      </a:pPr>
+                      <a:r>
+                        <a:rPr lang="en-US" sz="2400"/>
+                        <a:t>Description</a:t>
+                      </a:r>
+                    </a:p>
+                  </a:txBody>
+                  <a:tcPr/>
+                </a:tc>
+                <a:extLst>
+                  <a:ext uri="{0D108BD9-81ED-4DB2-BD59-A6C34878D82A}">
+                    <a16:rowId xmlns:a16="http://schemas.microsoft.com/office/drawing/2014/main" val="10000"/>
+                  </a:ext>
+                </a:extLst>
+              </a:tr>
+              <a:tr h="3281925">
+                <a:tc>
+                  <a:txBody>
+                    <a:bodyPr/>
+                    <a:lstStyle/>
+                    <a:p>
+                      <a:pPr>
+                        <a:buNone/>
+                      </a:pPr>
+                      <a:r>
+                        <a:rPr lang="en-US" sz="1600" b="0" dirty="0">
+                          <a:solidFill>
+                            <a:schemeClr val="tx1"/>
+                          </a:solidFill>
+                          <a:latin typeface="+mn-lt"/>
+                          <a:cs typeface="Times New Roman Bold" panose="02020503050405090304" charset="0"/>
+                        </a:rPr>
+                        <a:t>public static final String ACCOUNT_SID = </a:t>
+                      </a:r>
+                      <a:r>
+                        <a:rPr lang="en-US" sz="1600" b="0" dirty="0" err="1">
+                          <a:solidFill>
+                            <a:schemeClr val="tx1"/>
+                          </a:solidFill>
+                          <a:latin typeface="+mn-lt"/>
+                          <a:cs typeface="Times New Roman Bold" panose="02020503050405090304" charset="0"/>
+                        </a:rPr>
+                        <a:t>System.getenv</a:t>
+                      </a:r>
+                      <a:r>
+                        <a:rPr lang="en-US" sz="1600" b="0" dirty="0">
+                          <a:solidFill>
+                            <a:schemeClr val="tx1"/>
+                          </a:solidFill>
+                          <a:latin typeface="+mn-lt"/>
+                          <a:cs typeface="Times New Roman Bold" panose="02020503050405090304" charset="0"/>
+                        </a:rPr>
+                        <a:t>("TWILIO_ACCOUNT_SID");  </a:t>
+                      </a:r>
+                    </a:p>
+                    <a:p>
+                      <a:pPr>
+                        <a:buNone/>
+                      </a:pPr>
+                      <a:r>
+                        <a:rPr lang="en-US" sz="1600" b="0" dirty="0">
+                          <a:solidFill>
+                            <a:schemeClr val="tx1"/>
+                          </a:solidFill>
+                          <a:latin typeface="+mn-lt"/>
+                          <a:cs typeface="Times New Roman Bold" panose="02020503050405090304" charset="0"/>
+                        </a:rPr>
+                        <a:t>public static final String AUTH_TOKEN = </a:t>
+                      </a:r>
+                      <a:r>
+                        <a:rPr lang="en-US" sz="1600" b="0" dirty="0" err="1">
+                          <a:solidFill>
+                            <a:schemeClr val="tx1"/>
+                          </a:solidFill>
+                          <a:latin typeface="+mn-lt"/>
+                          <a:cs typeface="Times New Roman Bold" panose="02020503050405090304" charset="0"/>
+                        </a:rPr>
+                        <a:t>System.getenv</a:t>
+                      </a:r>
+                      <a:r>
+                        <a:rPr lang="en-US" sz="1600" b="0" dirty="0">
+                          <a:solidFill>
+                            <a:schemeClr val="tx1"/>
+                          </a:solidFill>
+                          <a:latin typeface="+mn-lt"/>
+                          <a:cs typeface="Times New Roman Bold" panose="02020503050405090304" charset="0"/>
+                        </a:rPr>
+                        <a:t>("TWILIO_AUTH_TOKEN");</a:t>
+                      </a:r>
+                    </a:p>
+                    <a:p>
+                      <a:pPr>
+                        <a:buNone/>
+                      </a:pPr>
+                      <a:endParaRPr lang="en-US" sz="1600" b="0" dirty="0">
+                        <a:solidFill>
+                          <a:schemeClr val="tx1"/>
+                        </a:solidFill>
+                        <a:latin typeface="+mn-lt"/>
+                        <a:cs typeface="Times New Roman Bold" panose="02020503050405090304" charset="0"/>
+                      </a:endParaRPr>
+                    </a:p>
+                    <a:p>
+                      <a:pPr>
+                        <a:buNone/>
+                      </a:pPr>
+                      <a:endParaRPr lang="en-US" sz="1600" b="0" dirty="0">
+                        <a:solidFill>
+                          <a:schemeClr val="tx1"/>
+                        </a:solidFill>
+                        <a:latin typeface="+mn-lt"/>
+                        <a:cs typeface="Times New Roman Bold" panose="02020503050405090304" charset="0"/>
+                      </a:endParaRPr>
+                    </a:p>
+                    <a:p>
+                      <a:pPr>
+                        <a:buNone/>
+                      </a:pPr>
+                      <a:r>
+                        <a:rPr lang="en-US" sz="1600" b="0" dirty="0" err="1">
+                          <a:solidFill>
+                            <a:schemeClr val="tx1"/>
+                          </a:solidFill>
+                          <a:latin typeface="+mn-lt"/>
+                          <a:cs typeface="Times New Roman Bold" panose="02020503050405090304" charset="0"/>
+                        </a:rPr>
+                        <a:t>Twilio.init</a:t>
+                      </a:r>
+                      <a:r>
+                        <a:rPr lang="en-US" sz="1600" b="0" dirty="0">
+                          <a:solidFill>
+                            <a:schemeClr val="tx1"/>
+                          </a:solidFill>
+                          <a:latin typeface="+mn-lt"/>
+                          <a:cs typeface="Times New Roman Bold" panose="02020503050405090304" charset="0"/>
+                        </a:rPr>
+                        <a:t>(ACCOUNT_SID, AUTH_TOKEN);        </a:t>
+                      </a:r>
+                    </a:p>
+                    <a:p>
+                      <a:pPr>
+                        <a:buNone/>
+                      </a:pPr>
+                      <a:r>
+                        <a:rPr lang="en-US" sz="1600" b="0" dirty="0">
+                          <a:solidFill>
+                            <a:schemeClr val="tx1"/>
+                          </a:solidFill>
+                          <a:latin typeface="+mn-lt"/>
+                          <a:cs typeface="Times New Roman Bold" panose="02020503050405090304" charset="0"/>
+                        </a:rPr>
+                        <a:t>Message </a:t>
+                      </a:r>
+                      <a:r>
+                        <a:rPr lang="en-US" sz="1600" b="0" dirty="0" err="1">
+                          <a:solidFill>
+                            <a:schemeClr val="tx1"/>
+                          </a:solidFill>
+                          <a:latin typeface="+mn-lt"/>
+                          <a:cs typeface="Times New Roman Bold" panose="02020503050405090304" charset="0"/>
+                        </a:rPr>
+                        <a:t>message</a:t>
+                      </a:r>
+                      <a:r>
+                        <a:rPr lang="en-US" sz="1600" b="0" dirty="0">
+                          <a:solidFill>
+                            <a:schemeClr val="tx1"/>
+                          </a:solidFill>
+                          <a:latin typeface="+mn-lt"/>
+                          <a:cs typeface="Times New Roman Bold" panose="02020503050405090304" charset="0"/>
+                        </a:rPr>
+                        <a:t> = </a:t>
+                      </a:r>
+                      <a:r>
+                        <a:rPr lang="en-US" sz="1600" b="0" dirty="0" err="1">
+                          <a:solidFill>
+                            <a:schemeClr val="tx1"/>
+                          </a:solidFill>
+                          <a:latin typeface="+mn-lt"/>
+                          <a:cs typeface="Times New Roman Bold" panose="02020503050405090304" charset="0"/>
+                        </a:rPr>
+                        <a:t>Message.creator</a:t>
+                      </a:r>
+                      <a:endParaRPr lang="en-US" sz="1600" b="0" dirty="0">
+                        <a:solidFill>
+                          <a:schemeClr val="tx1"/>
+                        </a:solidFill>
+                        <a:latin typeface="+mn-lt"/>
+                        <a:cs typeface="Times New Roman Bold" panose="02020503050405090304" charset="0"/>
+                      </a:endParaRPr>
+                    </a:p>
+                    <a:p>
+                      <a:pPr>
+                        <a:buNone/>
+                      </a:pPr>
+                      <a:r>
+                        <a:rPr lang="en-US" sz="1600" b="0" dirty="0">
+                          <a:solidFill>
+                            <a:schemeClr val="tx1"/>
+                          </a:solidFill>
+                          <a:latin typeface="+mn-lt"/>
+                          <a:cs typeface="Times New Roman Bold" panose="02020503050405090304" charset="0"/>
+                        </a:rPr>
+                        <a:t>     (new </a:t>
+                      </a:r>
+                      <a:r>
+                        <a:rPr lang="en-US" sz="1600" b="0" dirty="0" err="1">
+                          <a:solidFill>
+                            <a:schemeClr val="tx1"/>
+                          </a:solidFill>
+                          <a:latin typeface="+mn-lt"/>
+                          <a:cs typeface="Times New Roman Bold" panose="02020503050405090304" charset="0"/>
+                        </a:rPr>
+                        <a:t>com.twilio.type.PhoneNumber</a:t>
+                      </a:r>
+                      <a:r>
+                        <a:rPr lang="en-US" sz="1600" b="0" dirty="0">
+                          <a:solidFill>
+                            <a:schemeClr val="tx1"/>
+                          </a:solidFill>
+                          <a:latin typeface="+mn-lt"/>
+                          <a:cs typeface="Times New Roman Bold" panose="02020503050405090304" charset="0"/>
+                        </a:rPr>
+                        <a:t>("+14159352345"),                </a:t>
+                      </a:r>
+                    </a:p>
+                    <a:p>
+                      <a:pPr>
+                        <a:buNone/>
+                      </a:pPr>
+                      <a:r>
+                        <a:rPr lang="en-US" sz="1600" b="0" dirty="0">
+                          <a:solidFill>
+                            <a:schemeClr val="tx1"/>
+                          </a:solidFill>
+                          <a:latin typeface="+mn-lt"/>
+                          <a:cs typeface="Times New Roman Bold" panose="02020503050405090304" charset="0"/>
+                        </a:rPr>
+                        <a:t>      new </a:t>
+                      </a:r>
+                      <a:r>
+                        <a:rPr lang="en-US" sz="1600" b="0" dirty="0" err="1">
+                          <a:solidFill>
+                            <a:schemeClr val="tx1"/>
+                          </a:solidFill>
+                          <a:latin typeface="+mn-lt"/>
+                          <a:cs typeface="Times New Roman Bold" panose="02020503050405090304" charset="0"/>
+                        </a:rPr>
+                        <a:t>com.twilio.type.PhoneNumber</a:t>
+                      </a:r>
+                      <a:r>
+                        <a:rPr lang="en-US" sz="1600" b="0" dirty="0">
+                          <a:solidFill>
+                            <a:schemeClr val="tx1"/>
+                          </a:solidFill>
+                          <a:latin typeface="+mn-lt"/>
+                          <a:cs typeface="Times New Roman Bold" panose="02020503050405090304" charset="0"/>
+                        </a:rPr>
+                        <a:t>("+14158141829"),    </a:t>
+                      </a:r>
+                    </a:p>
+                    <a:p>
+                      <a:pPr>
+                        <a:buNone/>
+                      </a:pPr>
+                      <a:r>
+                        <a:rPr lang="en-US" sz="1600" b="0" dirty="0">
+                          <a:solidFill>
+                            <a:schemeClr val="tx1"/>
+                          </a:solidFill>
+                          <a:latin typeface="+mn-lt"/>
+                          <a:cs typeface="Times New Roman Bold" panose="02020503050405090304" charset="0"/>
+                        </a:rPr>
+                        <a:t>      "Where's Wallace?")</a:t>
+                      </a:r>
+                    </a:p>
+                    <a:p>
+                      <a:pPr>
+                        <a:buNone/>
+                      </a:pPr>
+                      <a:r>
+                        <a:rPr lang="en-US" sz="1600" b="0" dirty="0">
+                          <a:solidFill>
+                            <a:schemeClr val="tx1"/>
+                          </a:solidFill>
+                          <a:latin typeface="+mn-lt"/>
+                          <a:cs typeface="Times New Roman Bold" panose="02020503050405090304" charset="0"/>
+                        </a:rPr>
+                        <a:t>      .create();</a:t>
+                      </a:r>
+                    </a:p>
+                  </a:txBody>
+                  <a:tcPr/>
+                </a:tc>
+                <a:tc>
+                  <a:txBody>
+                    <a:bodyPr/>
+                    <a:lstStyle/>
+                    <a:p>
+                      <a:pPr>
+                        <a:buNone/>
+                      </a:pPr>
+                      <a:r>
+                        <a:rPr lang="en-US" sz="1600" dirty="0"/>
+                        <a:t>Account SID and Authentic Token of Twilio account is mentioned in the snippet</a:t>
+                      </a:r>
+                    </a:p>
+                  </a:txBody>
+                  <a:tcPr/>
+                </a:tc>
+                <a:extLst>
+                  <a:ext uri="{0D108BD9-81ED-4DB2-BD59-A6C34878D82A}">
+                    <a16:rowId xmlns:a16="http://schemas.microsoft.com/office/drawing/2014/main" val="10001"/>
+                  </a:ext>
+                </a:extLst>
+              </a:tr>
+            </a:tbl>
+          </a:graphicData>
+        </a:graphic>
+      </p:graphicFrame>
+    </p:spTree>
+    <p:extLst>
+      <p:ext uri="{BB962C8B-B14F-4D97-AF65-F5344CB8AC3E}">
+        <p14:creationId xmlns:p14="http://schemas.microsoft.com/office/powerpoint/2010/main" val="4149779796"/>
+      </p:ext>
+    </p:extLst>
+  </p:cSld>
+  <p:clrMapOvr>
+    <a:masterClrMapping/>
+  </p:clrMapOvr>
+  <p:transition>
+    <p:dissolve/>
+  </p:transition>
+</p:sld>
+</file>
+
+<file path=ppt/slides/slide51.xml><?xml version="1.0" encoding="utf-8"?>
+<p:sld xmlns:a="http://schemas.openxmlformats.org/drawingml/2006/main" xmlns:r="http://schemas.openxmlformats.org/officeDocument/2006/relationships" xmlns:p="http://schemas.openxmlformats.org/presentationml/2006/main">
+  <p:cSld>
+    <p:spTree>
+      <p:nvGrpSpPr>
+        <p:cNvPr id="1" name=""/>
+        <p:cNvGrpSpPr/>
+        <p:nvPr/>
+      </p:nvGrpSpPr>
+      <p:grpSpPr>
+        <a:xfrm>
+          <a:off x="0" y="0"/>
+          <a:ext cx="0" cy="0"/>
+          <a:chOff x="0" y="0"/>
+          <a:chExt cx="0" cy="0"/>
+        </a:xfrm>
+      </p:grpSpPr>
+      <p:sp>
+        <p:nvSpPr>
+          <p:cNvPr id="2" name="Title 1"/>
+          <p:cNvSpPr>
+            <a:spLocks noGrp="1"/>
+          </p:cNvSpPr>
+          <p:nvPr>
+            <p:ph type="title"/>
+          </p:nvPr>
+        </p:nvSpPr>
+        <p:spPr/>
+        <p:txBody>
+          <a:bodyPr/>
+          <a:lstStyle/>
+          <a:p>
+            <a:r>
+              <a:rPr lang="en-US" dirty="0"/>
+              <a:t>Inter-Agent communication(contd.)</a:t>
+            </a:r>
+          </a:p>
+        </p:txBody>
+      </p:sp>
+      <p:sp>
+        <p:nvSpPr>
+          <p:cNvPr id="3" name="Content Placeholder 2"/>
+          <p:cNvSpPr>
+            <a:spLocks noGrp="1"/>
+          </p:cNvSpPr>
+          <p:nvPr>
+            <p:ph idx="1"/>
+          </p:nvPr>
+        </p:nvSpPr>
+        <p:spPr/>
+        <p:txBody>
+          <a:bodyPr/>
+          <a:lstStyle/>
+          <a:p>
+            <a:r>
+              <a:rPr lang="en-US" dirty="0"/>
+              <a:t>Twilio Rest-API : Output parameters</a:t>
+            </a:r>
+          </a:p>
+        </p:txBody>
+      </p:sp>
+      <p:sp>
+        <p:nvSpPr>
+          <p:cNvPr id="4" name="Date Placeholder 3"/>
+          <p:cNvSpPr>
+            <a:spLocks noGrp="1"/>
+          </p:cNvSpPr>
+          <p:nvPr>
+            <p:ph type="dt" sz="half" idx="10"/>
+          </p:nvPr>
+        </p:nvSpPr>
+        <p:spPr/>
+        <p:txBody>
+          <a:bodyPr/>
+          <a:lstStyle/>
+          <a:p>
+            <a:r>
+              <a:rPr lang="en-US"/>
+              <a:t>SENG697 (Fall 2007)</a:t>
+            </a:r>
+            <a:endParaRPr lang="en-US" altLang="ja-JP"/>
+          </a:p>
+        </p:txBody>
+      </p:sp>
+      <p:sp>
+        <p:nvSpPr>
+          <p:cNvPr id="5" name="Footer Placeholder 4"/>
+          <p:cNvSpPr>
+            <a:spLocks noGrp="1"/>
+          </p:cNvSpPr>
+          <p:nvPr>
+            <p:ph type="ftr" sz="quarter" idx="11"/>
+          </p:nvPr>
+        </p:nvSpPr>
+        <p:spPr/>
+        <p:txBody>
+          <a:bodyPr/>
+          <a:lstStyle/>
+          <a:p>
+            <a:r>
+              <a:rPr lang="ja-JP" altLang="en-US"/>
+              <a:t>far@ucalgary.ca</a:t>
+            </a:r>
+            <a:endParaRPr lang="en-US" altLang="ja-JP"/>
+          </a:p>
+        </p:txBody>
+      </p:sp>
+      <p:sp>
+        <p:nvSpPr>
+          <p:cNvPr id="6" name="Slide Number Placeholder 5"/>
+          <p:cNvSpPr>
+            <a:spLocks noGrp="1"/>
+          </p:cNvSpPr>
+          <p:nvPr>
+            <p:ph type="sldNum" sz="quarter" idx="12"/>
+          </p:nvPr>
+        </p:nvSpPr>
+        <p:spPr/>
+        <p:txBody>
+          <a:bodyPr/>
+          <a:lstStyle/>
+          <a:p>
+            <a:fld id="{A4BAB868-1E00-44C6-B1AB-DFCC5F9865BA}" type="slidenum">
+              <a:rPr lang="ja-JP" altLang="en-US"/>
+              <a:t>51</a:t>
+            </a:fld>
+            <a:endParaRPr lang="en-US" altLang="ja-JP"/>
+          </a:p>
+        </p:txBody>
+      </p:sp>
+      <p:graphicFrame>
+        <p:nvGraphicFramePr>
+          <p:cNvPr id="7" name="Table 6"/>
+          <p:cNvGraphicFramePr/>
+          <p:nvPr>
+            <p:custDataLst>
+              <p:tags r:id="rId1"/>
+            </p:custDataLst>
+            <p:extLst>
+              <p:ext uri="{D42A27DB-BD31-4B8C-83A1-F6EECF244321}">
+                <p14:modId xmlns:p14="http://schemas.microsoft.com/office/powerpoint/2010/main" val="3194820981"/>
+              </p:ext>
+            </p:extLst>
+          </p:nvPr>
+        </p:nvGraphicFramePr>
+        <p:xfrm>
+          <a:off x="1614170" y="2175509"/>
+          <a:ext cx="9169400" cy="4023360"/>
+        </p:xfrm>
+        <a:graphic>
+          <a:graphicData uri="http://schemas.openxmlformats.org/drawingml/2006/table">
+            <a:tbl>
+              <a:tblPr firstRow="1" bandRow="1">
+                <a:tableStyleId>{5C22544A-7EE6-4342-B048-85BDC9FD1C3A}</a:tableStyleId>
+              </a:tblPr>
+              <a:tblGrid>
+                <a:gridCol w="6842125">
+                  <a:extLst>
+                    <a:ext uri="{9D8B030D-6E8A-4147-A177-3AD203B41FA5}">
+                      <a16:colId xmlns:a16="http://schemas.microsoft.com/office/drawing/2014/main" val="20000"/>
+                    </a:ext>
+                  </a:extLst>
+                </a:gridCol>
+                <a:gridCol w="2327275">
+                  <a:extLst>
+                    <a:ext uri="{9D8B030D-6E8A-4147-A177-3AD203B41FA5}">
+                      <a16:colId xmlns:a16="http://schemas.microsoft.com/office/drawing/2014/main" val="20001"/>
+                    </a:ext>
+                  </a:extLst>
+                </a:gridCol>
+              </a:tblGrid>
+              <a:tr h="441082">
+                <a:tc>
+                  <a:txBody>
+                    <a:bodyPr/>
+                    <a:lstStyle/>
+                    <a:p>
+                      <a:pPr>
+                        <a:buNone/>
+                      </a:pPr>
+                      <a:r>
+                        <a:rPr lang="en-US" sz="2400"/>
+                        <a:t>Parameters</a:t>
+                      </a:r>
+                    </a:p>
+                  </a:txBody>
+                  <a:tcPr/>
+                </a:tc>
+                <a:tc>
+                  <a:txBody>
+                    <a:bodyPr/>
+                    <a:lstStyle/>
+                    <a:p>
+                      <a:pPr>
+                        <a:buNone/>
+                      </a:pPr>
+                      <a:r>
+                        <a:rPr lang="en-US" sz="2400"/>
+                        <a:t>Description</a:t>
+                      </a:r>
+                    </a:p>
+                  </a:txBody>
+                  <a:tcPr/>
+                </a:tc>
+                <a:extLst>
+                  <a:ext uri="{0D108BD9-81ED-4DB2-BD59-A6C34878D82A}">
+                    <a16:rowId xmlns:a16="http://schemas.microsoft.com/office/drawing/2014/main" val="10000"/>
+                  </a:ext>
+                </a:extLst>
+              </a:tr>
+              <a:tr h="3281925">
+                <a:tc>
+                  <a:txBody>
+                    <a:bodyPr/>
+                    <a:lstStyle/>
+                    <a:p>
+                      <a:pPr>
+                        <a:buNone/>
+                      </a:pPr>
+                      <a:r>
+                        <a:rPr lang="en-US" sz="1200" b="0" dirty="0">
+                          <a:solidFill>
+                            <a:schemeClr val="tx1"/>
+                          </a:solidFill>
+                          <a:latin typeface="+mn-lt"/>
+                          <a:cs typeface="Times New Roman Bold" panose="02020503050405090304" charset="0"/>
+                        </a:rPr>
+                        <a:t>{  "</a:t>
+                      </a:r>
+                      <a:r>
+                        <a:rPr lang="en-US" sz="1200" b="0" dirty="0" err="1">
+                          <a:solidFill>
+                            <a:schemeClr val="tx1"/>
+                          </a:solidFill>
+                          <a:latin typeface="+mn-lt"/>
+                          <a:cs typeface="Times New Roman Bold" panose="02020503050405090304" charset="0"/>
+                        </a:rPr>
+                        <a:t>account_sid</a:t>
+                      </a:r>
+                      <a:r>
+                        <a:rPr lang="en-US" sz="1200" b="0" dirty="0">
+                          <a:solidFill>
+                            <a:schemeClr val="tx1"/>
+                          </a:solidFill>
+                          <a:latin typeface="+mn-lt"/>
+                          <a:cs typeface="Times New Roman Bold" panose="02020503050405090304" charset="0"/>
+                        </a:rPr>
+                        <a:t>": "ACXXXXXXXXXXXXXXXXXXXXXXXXXXXXXXXX",  </a:t>
+                      </a:r>
+                    </a:p>
+                    <a:p>
+                      <a:pPr>
+                        <a:buNone/>
+                      </a:pPr>
+                      <a:r>
+                        <a:rPr lang="en-US" sz="1200" b="0" dirty="0">
+                          <a:solidFill>
+                            <a:schemeClr val="tx1"/>
+                          </a:solidFill>
+                          <a:latin typeface="+mn-lt"/>
+                          <a:cs typeface="Times New Roman Bold" panose="02020503050405090304" charset="0"/>
+                        </a:rPr>
+                        <a:t>"</a:t>
+                      </a:r>
+                      <a:r>
+                        <a:rPr lang="en-US" sz="1200" b="0" dirty="0" err="1">
+                          <a:solidFill>
+                            <a:schemeClr val="tx1"/>
+                          </a:solidFill>
+                          <a:latin typeface="+mn-lt"/>
+                          <a:cs typeface="Times New Roman Bold" panose="02020503050405090304" charset="0"/>
+                        </a:rPr>
+                        <a:t>api_version</a:t>
+                      </a:r>
+                      <a:r>
+                        <a:rPr lang="en-US" sz="1200" b="0" dirty="0">
+                          <a:solidFill>
+                            <a:schemeClr val="tx1"/>
+                          </a:solidFill>
+                          <a:latin typeface="+mn-lt"/>
+                          <a:cs typeface="Times New Roman Bold" panose="02020503050405090304" charset="0"/>
+                        </a:rPr>
+                        <a:t>": "2010-04-01", </a:t>
+                      </a:r>
+                    </a:p>
+                    <a:p>
+                      <a:pPr>
+                        <a:buNone/>
+                      </a:pPr>
+                      <a:r>
+                        <a:rPr lang="en-US" sz="1200" b="0" dirty="0">
+                          <a:solidFill>
+                            <a:schemeClr val="tx1"/>
+                          </a:solidFill>
+                          <a:latin typeface="+mn-lt"/>
+                          <a:cs typeface="Times New Roman Bold" panose="02020503050405090304" charset="0"/>
+                        </a:rPr>
+                        <a:t> "body": "Hi there",  </a:t>
+                      </a:r>
+                    </a:p>
+                    <a:p>
+                      <a:pPr>
+                        <a:buNone/>
+                      </a:pPr>
+                      <a:r>
+                        <a:rPr lang="en-US" sz="1200" b="0" dirty="0">
+                          <a:solidFill>
+                            <a:schemeClr val="tx1"/>
+                          </a:solidFill>
+                          <a:latin typeface="+mn-lt"/>
+                          <a:cs typeface="Times New Roman Bold" panose="02020503050405090304" charset="0"/>
+                        </a:rPr>
+                        <a:t>"</a:t>
+                      </a:r>
+                      <a:r>
+                        <a:rPr lang="en-US" sz="1200" b="0" dirty="0" err="1">
+                          <a:solidFill>
+                            <a:schemeClr val="tx1"/>
+                          </a:solidFill>
+                          <a:latin typeface="+mn-lt"/>
+                          <a:cs typeface="Times New Roman Bold" panose="02020503050405090304" charset="0"/>
+                        </a:rPr>
+                        <a:t>date_created</a:t>
+                      </a:r>
+                      <a:r>
+                        <a:rPr lang="en-US" sz="1200" b="0" dirty="0">
+                          <a:solidFill>
+                            <a:schemeClr val="tx1"/>
+                          </a:solidFill>
+                          <a:latin typeface="+mn-lt"/>
+                          <a:cs typeface="Times New Roman Bold" panose="02020503050405090304" charset="0"/>
+                        </a:rPr>
+                        <a:t>": "Thu, 30 Jul 2015 20:12:31 +0000", </a:t>
+                      </a:r>
+                    </a:p>
+                    <a:p>
+                      <a:pPr>
+                        <a:buNone/>
+                      </a:pPr>
+                      <a:r>
+                        <a:rPr lang="en-US" sz="1200" b="0" dirty="0">
+                          <a:solidFill>
+                            <a:schemeClr val="tx1"/>
+                          </a:solidFill>
+                          <a:latin typeface="+mn-lt"/>
+                          <a:cs typeface="Times New Roman Bold" panose="02020503050405090304" charset="0"/>
+                        </a:rPr>
+                        <a:t> "</a:t>
+                      </a:r>
+                      <a:r>
+                        <a:rPr lang="en-US" sz="1200" b="0" dirty="0" err="1">
+                          <a:solidFill>
+                            <a:schemeClr val="tx1"/>
+                          </a:solidFill>
+                          <a:latin typeface="+mn-lt"/>
+                          <a:cs typeface="Times New Roman Bold" panose="02020503050405090304" charset="0"/>
+                        </a:rPr>
+                        <a:t>date_sent</a:t>
+                      </a:r>
+                      <a:r>
+                        <a:rPr lang="en-US" sz="1200" b="0" dirty="0">
+                          <a:solidFill>
+                            <a:schemeClr val="tx1"/>
+                          </a:solidFill>
+                          <a:latin typeface="+mn-lt"/>
+                          <a:cs typeface="Times New Roman Bold" panose="02020503050405090304" charset="0"/>
+                        </a:rPr>
+                        <a:t>": "Thu, 30 Jul 2015 20:12:33 +0000", </a:t>
+                      </a:r>
+                    </a:p>
+                    <a:p>
+                      <a:pPr>
+                        <a:buNone/>
+                      </a:pPr>
+                      <a:r>
+                        <a:rPr lang="en-US" sz="1200" b="0" dirty="0">
+                          <a:solidFill>
+                            <a:schemeClr val="tx1"/>
+                          </a:solidFill>
+                          <a:latin typeface="+mn-lt"/>
+                          <a:cs typeface="Times New Roman Bold" panose="02020503050405090304" charset="0"/>
+                        </a:rPr>
+                        <a:t> "</a:t>
+                      </a:r>
+                      <a:r>
+                        <a:rPr lang="en-US" sz="1200" b="0" dirty="0" err="1">
+                          <a:solidFill>
+                            <a:schemeClr val="tx1"/>
+                          </a:solidFill>
+                          <a:latin typeface="+mn-lt"/>
+                          <a:cs typeface="Times New Roman Bold" panose="02020503050405090304" charset="0"/>
+                        </a:rPr>
+                        <a:t>date_updated</a:t>
+                      </a:r>
+                      <a:r>
+                        <a:rPr lang="en-US" sz="1200" b="0" dirty="0">
+                          <a:solidFill>
+                            <a:schemeClr val="tx1"/>
+                          </a:solidFill>
+                          <a:latin typeface="+mn-lt"/>
+                          <a:cs typeface="Times New Roman Bold" panose="02020503050405090304" charset="0"/>
+                        </a:rPr>
+                        <a:t>": "Thu, 30 Jul 2015 20:12:33 +0000", </a:t>
+                      </a:r>
+                    </a:p>
+                    <a:p>
+                      <a:pPr>
+                        <a:buNone/>
+                      </a:pPr>
+                      <a:r>
+                        <a:rPr lang="en-US" sz="1200" b="0" dirty="0">
+                          <a:solidFill>
+                            <a:schemeClr val="tx1"/>
+                          </a:solidFill>
+                          <a:latin typeface="+mn-lt"/>
+                          <a:cs typeface="Times New Roman Bold" panose="02020503050405090304" charset="0"/>
+                        </a:rPr>
+                        <a:t> "direction": "outbound-</a:t>
+                      </a:r>
+                      <a:r>
+                        <a:rPr lang="en-US" sz="1200" b="0" dirty="0" err="1">
+                          <a:solidFill>
+                            <a:schemeClr val="tx1"/>
+                          </a:solidFill>
+                          <a:latin typeface="+mn-lt"/>
+                          <a:cs typeface="Times New Roman Bold" panose="02020503050405090304" charset="0"/>
+                        </a:rPr>
+                        <a:t>api</a:t>
+                      </a:r>
+                      <a:r>
+                        <a:rPr lang="en-US" sz="1200" b="0" dirty="0">
+                          <a:solidFill>
+                            <a:schemeClr val="tx1"/>
+                          </a:solidFill>
+                          <a:latin typeface="+mn-lt"/>
+                          <a:cs typeface="Times New Roman Bold" panose="02020503050405090304" charset="0"/>
+                        </a:rPr>
+                        <a:t>",  "</a:t>
+                      </a:r>
+                      <a:r>
+                        <a:rPr lang="en-US" sz="1200" b="0" dirty="0" err="1">
+                          <a:solidFill>
+                            <a:schemeClr val="tx1"/>
+                          </a:solidFill>
+                          <a:latin typeface="+mn-lt"/>
+                          <a:cs typeface="Times New Roman Bold" panose="02020503050405090304" charset="0"/>
+                        </a:rPr>
+                        <a:t>error_code</a:t>
+                      </a:r>
+                      <a:r>
+                        <a:rPr lang="en-US" sz="1200" b="0" dirty="0">
+                          <a:solidFill>
+                            <a:schemeClr val="tx1"/>
+                          </a:solidFill>
+                          <a:latin typeface="+mn-lt"/>
+                          <a:cs typeface="Times New Roman Bold" panose="02020503050405090304" charset="0"/>
+                        </a:rPr>
+                        <a:t>": null,</a:t>
+                      </a:r>
+                    </a:p>
+                    <a:p>
+                      <a:pPr>
+                        <a:buNone/>
+                      </a:pPr>
+                      <a:r>
+                        <a:rPr lang="en-US" sz="1200" b="0" dirty="0">
+                          <a:solidFill>
+                            <a:schemeClr val="tx1"/>
+                          </a:solidFill>
+                          <a:latin typeface="+mn-lt"/>
+                          <a:cs typeface="Times New Roman Bold" panose="02020503050405090304" charset="0"/>
+                        </a:rPr>
+                        <a:t>  "</a:t>
+                      </a:r>
+                      <a:r>
+                        <a:rPr lang="en-US" sz="1200" b="0" dirty="0" err="1">
+                          <a:solidFill>
+                            <a:schemeClr val="tx1"/>
+                          </a:solidFill>
+                          <a:latin typeface="+mn-lt"/>
+                          <a:cs typeface="Times New Roman Bold" panose="02020503050405090304" charset="0"/>
+                        </a:rPr>
+                        <a:t>error_message</a:t>
+                      </a:r>
+                      <a:r>
+                        <a:rPr lang="en-US" sz="1200" b="0" dirty="0">
+                          <a:solidFill>
+                            <a:schemeClr val="tx1"/>
+                          </a:solidFill>
+                          <a:latin typeface="+mn-lt"/>
+                          <a:cs typeface="Times New Roman Bold" panose="02020503050405090304" charset="0"/>
+                        </a:rPr>
+                        <a:t>": null,  "from": "+14155552345", </a:t>
+                      </a:r>
+                    </a:p>
+                    <a:p>
+                      <a:pPr>
+                        <a:buNone/>
+                      </a:pPr>
+                      <a:r>
+                        <a:rPr lang="en-US" sz="1200" b="0" dirty="0">
+                          <a:solidFill>
+                            <a:schemeClr val="tx1"/>
+                          </a:solidFill>
+                          <a:latin typeface="+mn-lt"/>
+                          <a:cs typeface="Times New Roman Bold" panose="02020503050405090304" charset="0"/>
+                        </a:rPr>
+                        <a:t> "</a:t>
+                      </a:r>
+                      <a:r>
+                        <a:rPr lang="en-US" sz="1200" b="0" dirty="0" err="1">
+                          <a:solidFill>
+                            <a:schemeClr val="tx1"/>
+                          </a:solidFill>
+                          <a:latin typeface="+mn-lt"/>
+                          <a:cs typeface="Times New Roman Bold" panose="02020503050405090304" charset="0"/>
+                        </a:rPr>
+                        <a:t>messaging_service_sid</a:t>
+                      </a:r>
+                      <a:r>
+                        <a:rPr lang="en-US" sz="1200" b="0" dirty="0">
+                          <a:solidFill>
+                            <a:schemeClr val="tx1"/>
+                          </a:solidFill>
+                          <a:latin typeface="+mn-lt"/>
+                          <a:cs typeface="Times New Roman Bold" panose="02020503050405090304" charset="0"/>
+                        </a:rPr>
+                        <a:t>": null,</a:t>
+                      </a:r>
+                    </a:p>
+                    <a:p>
+                      <a:pPr>
+                        <a:buNone/>
+                      </a:pPr>
+                      <a:r>
+                        <a:rPr lang="en-US" sz="1200" b="0" dirty="0">
+                          <a:solidFill>
+                            <a:schemeClr val="tx1"/>
+                          </a:solidFill>
+                          <a:latin typeface="+mn-lt"/>
+                          <a:cs typeface="Times New Roman Bold" panose="02020503050405090304" charset="0"/>
+                        </a:rPr>
+                        <a:t>  "</a:t>
+                      </a:r>
+                      <a:r>
+                        <a:rPr lang="en-US" sz="1200" b="0" dirty="0" err="1">
+                          <a:solidFill>
+                            <a:schemeClr val="tx1"/>
+                          </a:solidFill>
+                          <a:latin typeface="+mn-lt"/>
+                          <a:cs typeface="Times New Roman Bold" panose="02020503050405090304" charset="0"/>
+                        </a:rPr>
+                        <a:t>num_media</a:t>
+                      </a:r>
+                      <a:r>
+                        <a:rPr lang="en-US" sz="1200" b="0" dirty="0">
+                          <a:solidFill>
+                            <a:schemeClr val="tx1"/>
+                          </a:solidFill>
+                          <a:latin typeface="+mn-lt"/>
+                          <a:cs typeface="Times New Roman Bold" panose="02020503050405090304" charset="0"/>
+                        </a:rPr>
+                        <a:t>": "0", </a:t>
+                      </a:r>
+                    </a:p>
+                    <a:p>
+                      <a:pPr>
+                        <a:buNone/>
+                      </a:pPr>
+                      <a:r>
+                        <a:rPr lang="en-US" sz="1200" b="0" dirty="0">
+                          <a:solidFill>
+                            <a:schemeClr val="tx1"/>
+                          </a:solidFill>
+                          <a:latin typeface="+mn-lt"/>
+                          <a:cs typeface="Times New Roman Bold" panose="02020503050405090304" charset="0"/>
+                        </a:rPr>
+                        <a:t> "</a:t>
+                      </a:r>
+                      <a:r>
+                        <a:rPr lang="en-US" sz="1200" b="0" dirty="0" err="1">
+                          <a:solidFill>
+                            <a:schemeClr val="tx1"/>
+                          </a:solidFill>
+                          <a:latin typeface="+mn-lt"/>
+                          <a:cs typeface="Times New Roman Bold" panose="02020503050405090304" charset="0"/>
+                        </a:rPr>
+                        <a:t>num_segments</a:t>
+                      </a:r>
+                      <a:r>
+                        <a:rPr lang="en-US" sz="1200" b="0" dirty="0">
+                          <a:solidFill>
+                            <a:schemeClr val="tx1"/>
+                          </a:solidFill>
+                          <a:latin typeface="+mn-lt"/>
+                          <a:cs typeface="Times New Roman Bold" panose="02020503050405090304" charset="0"/>
+                        </a:rPr>
+                        <a:t>": "1", </a:t>
+                      </a:r>
+                    </a:p>
+                    <a:p>
+                      <a:pPr>
+                        <a:buNone/>
+                      </a:pPr>
+                      <a:r>
+                        <a:rPr lang="en-US" sz="1200" b="0" dirty="0">
+                          <a:solidFill>
+                            <a:schemeClr val="tx1"/>
+                          </a:solidFill>
+                          <a:latin typeface="+mn-lt"/>
+                          <a:cs typeface="Times New Roman Bold" panose="02020503050405090304" charset="0"/>
+                        </a:rPr>
+                        <a:t> "price": null,  "</a:t>
+                      </a:r>
+                      <a:r>
+                        <a:rPr lang="en-US" sz="1200" b="0" dirty="0" err="1">
+                          <a:solidFill>
+                            <a:schemeClr val="tx1"/>
+                          </a:solidFill>
+                          <a:latin typeface="+mn-lt"/>
+                          <a:cs typeface="Times New Roman Bold" panose="02020503050405090304" charset="0"/>
+                        </a:rPr>
+                        <a:t>price_unit</a:t>
+                      </a:r>
+                      <a:r>
+                        <a:rPr lang="en-US" sz="1200" b="0" dirty="0">
+                          <a:solidFill>
+                            <a:schemeClr val="tx1"/>
+                          </a:solidFill>
+                          <a:latin typeface="+mn-lt"/>
+                          <a:cs typeface="Times New Roman Bold" panose="02020503050405090304" charset="0"/>
+                        </a:rPr>
+                        <a:t>": null, </a:t>
+                      </a:r>
+                    </a:p>
+                    <a:p>
+                      <a:pPr>
+                        <a:buNone/>
+                      </a:pPr>
+                      <a:r>
+                        <a:rPr lang="en-US" sz="1200" b="0" dirty="0">
+                          <a:solidFill>
+                            <a:schemeClr val="tx1"/>
+                          </a:solidFill>
+                          <a:latin typeface="+mn-lt"/>
+                          <a:cs typeface="Times New Roman Bold" panose="02020503050405090304" charset="0"/>
+                        </a:rPr>
+                        <a:t> "</a:t>
+                      </a:r>
+                      <a:r>
+                        <a:rPr lang="en-US" sz="1200" b="0" dirty="0" err="1">
+                          <a:solidFill>
+                            <a:schemeClr val="tx1"/>
+                          </a:solidFill>
+                          <a:latin typeface="+mn-lt"/>
+                          <a:cs typeface="Times New Roman Bold" panose="02020503050405090304" charset="0"/>
+                        </a:rPr>
+                        <a:t>sid</a:t>
+                      </a:r>
+                      <a:r>
+                        <a:rPr lang="en-US" sz="1200" b="0" dirty="0">
+                          <a:solidFill>
+                            <a:schemeClr val="tx1"/>
+                          </a:solidFill>
+                          <a:latin typeface="+mn-lt"/>
+                          <a:cs typeface="Times New Roman Bold" panose="02020503050405090304" charset="0"/>
+                        </a:rPr>
+                        <a:t>": "SMXXXXXXXXXXXXXXXXXXXXXXXXXXXXXXXX", </a:t>
+                      </a:r>
+                    </a:p>
+                    <a:p>
+                      <a:pPr>
+                        <a:buNone/>
+                      </a:pPr>
+                      <a:r>
+                        <a:rPr lang="en-US" sz="1200" b="0" dirty="0">
+                          <a:solidFill>
+                            <a:schemeClr val="tx1"/>
+                          </a:solidFill>
+                          <a:latin typeface="+mn-lt"/>
+                          <a:cs typeface="Times New Roman Bold" panose="02020503050405090304" charset="0"/>
+                        </a:rPr>
+                        <a:t> "status": "sent",  </a:t>
+                      </a:r>
+                    </a:p>
+                    <a:p>
+                      <a:pPr>
+                        <a:buNone/>
+                      </a:pPr>
+                      <a:r>
+                        <a:rPr lang="en-US" sz="1200" b="0" dirty="0">
+                          <a:solidFill>
+                            <a:schemeClr val="tx1"/>
+                          </a:solidFill>
+                          <a:latin typeface="+mn-lt"/>
+                          <a:cs typeface="Times New Roman Bold" panose="02020503050405090304" charset="0"/>
+                        </a:rPr>
+                        <a:t>"</a:t>
+                      </a:r>
+                      <a:r>
+                        <a:rPr lang="en-US" sz="1200" b="0" dirty="0" err="1">
+                          <a:solidFill>
+                            <a:schemeClr val="tx1"/>
+                          </a:solidFill>
+                          <a:latin typeface="+mn-lt"/>
+                          <a:cs typeface="Times New Roman Bold" panose="02020503050405090304" charset="0"/>
+                        </a:rPr>
+                        <a:t>subresource_uris</a:t>
+                      </a:r>
+                      <a:r>
+                        <a:rPr lang="en-US" sz="1200" b="0" dirty="0">
+                          <a:solidFill>
+                            <a:schemeClr val="tx1"/>
+                          </a:solidFill>
+                          <a:latin typeface="+mn-lt"/>
+                          <a:cs typeface="Times New Roman Bold" panose="02020503050405090304" charset="0"/>
+                        </a:rPr>
+                        <a:t>": {    "media": "/2010-04-01/Accounts/ACXXXXXXXXXXXXXXXXXXXXXXXXXXXXXXXX/Messages/SMXXXXXXXXXXXXXXXXXXXXXXXXXXXXXXXX/</a:t>
+                      </a:r>
+                      <a:r>
+                        <a:rPr lang="en-US" sz="1200" b="0" dirty="0" err="1">
+                          <a:solidFill>
+                            <a:schemeClr val="tx1"/>
+                          </a:solidFill>
+                          <a:latin typeface="+mn-lt"/>
+                          <a:cs typeface="Times New Roman Bold" panose="02020503050405090304" charset="0"/>
+                        </a:rPr>
+                        <a:t>Media.json</a:t>
+                      </a:r>
+                      <a:r>
+                        <a:rPr lang="en-US" sz="1200" b="0" dirty="0">
+                          <a:solidFill>
+                            <a:schemeClr val="tx1"/>
+                          </a:solidFill>
+                          <a:latin typeface="+mn-lt"/>
+                          <a:cs typeface="Times New Roman Bold" panose="02020503050405090304" charset="0"/>
+                        </a:rPr>
+                        <a:t>"  },  "to": "+14155552345",  "</a:t>
+                      </a:r>
+                      <a:r>
+                        <a:rPr lang="en-US" sz="1200" b="0" dirty="0" err="1">
+                          <a:solidFill>
+                            <a:schemeClr val="tx1"/>
+                          </a:solidFill>
+                          <a:latin typeface="+mn-lt"/>
+                          <a:cs typeface="Times New Roman Bold" panose="02020503050405090304" charset="0"/>
+                        </a:rPr>
+                        <a:t>uri</a:t>
+                      </a:r>
+                      <a:r>
+                        <a:rPr lang="en-US" sz="1200" b="0" dirty="0">
+                          <a:solidFill>
+                            <a:schemeClr val="tx1"/>
+                          </a:solidFill>
+                          <a:latin typeface="+mn-lt"/>
+                          <a:cs typeface="Times New Roman Bold" panose="02020503050405090304" charset="0"/>
+                        </a:rPr>
+                        <a:t>": "/2010-04-01/Accounts/ACXXXXXXXXXXXXXXXXXXXXXXXXXXXXXXXX/Messages/</a:t>
+                      </a:r>
+                      <a:r>
+                        <a:rPr lang="en-US" sz="1200" b="0" dirty="0" err="1">
+                          <a:solidFill>
+                            <a:schemeClr val="tx1"/>
+                          </a:solidFill>
+                          <a:latin typeface="+mn-lt"/>
+                          <a:cs typeface="Times New Roman Bold" panose="02020503050405090304" charset="0"/>
+                        </a:rPr>
+                        <a:t>SMXXXXXXXXXXXXXXXXXXXXXXXXXXXXXXXX.json</a:t>
+                      </a:r>
+                      <a:r>
+                        <a:rPr lang="en-US" sz="1200" b="0" dirty="0">
+                          <a:solidFill>
+                            <a:schemeClr val="tx1"/>
+                          </a:solidFill>
+                          <a:latin typeface="+mn-lt"/>
+                          <a:cs typeface="Times New Roman Bold" panose="02020503050405090304" charset="0"/>
+                        </a:rPr>
+                        <a:t>"}</a:t>
+                      </a:r>
+                    </a:p>
+                  </a:txBody>
+                  <a:tcPr/>
+                </a:tc>
+                <a:tc>
+                  <a:txBody>
+                    <a:bodyPr/>
+                    <a:lstStyle/>
+                    <a:p>
+                      <a:pPr>
+                        <a:buNone/>
+                      </a:pPr>
+                      <a:r>
+                        <a:rPr lang="en-US" sz="1600" dirty="0"/>
+                        <a:t>Parameters from the output of the message from the </a:t>
+                      </a:r>
+                      <a:r>
+                        <a:rPr lang="en-US" sz="1600" dirty="0" err="1"/>
+                        <a:t>twilio</a:t>
+                      </a:r>
+                      <a:r>
+                        <a:rPr lang="en-US" sz="1600" dirty="0"/>
+                        <a:t> message received by the user is described in the snippet.                                              </a:t>
+                      </a:r>
+                    </a:p>
+                  </a:txBody>
+                  <a:tcPr/>
+                </a:tc>
+                <a:extLst>
+                  <a:ext uri="{0D108BD9-81ED-4DB2-BD59-A6C34878D82A}">
+                    <a16:rowId xmlns:a16="http://schemas.microsoft.com/office/drawing/2014/main" val="10001"/>
+                  </a:ext>
+                </a:extLst>
+              </a:tr>
+            </a:tbl>
+          </a:graphicData>
+        </a:graphic>
+      </p:graphicFrame>
+    </p:spTree>
+    <p:extLst>
+      <p:ext uri="{BB962C8B-B14F-4D97-AF65-F5344CB8AC3E}">
+        <p14:creationId xmlns:p14="http://schemas.microsoft.com/office/powerpoint/2010/main" val="1540522922"/>
+      </p:ext>
+    </p:extLst>
+  </p:cSld>
+  <p:clrMapOvr>
+    <a:masterClrMapping/>
+  </p:clrMapOvr>
+  <p:transition>
+    <p:dissolve/>
+  </p:transition>
+</p:sld>
+</file>
+
+<file path=ppt/slides/slide52.xml><?xml version="1.0" encoding="utf-8"?>
+<p:sld xmlns:a="http://schemas.openxmlformats.org/drawingml/2006/main" xmlns:r="http://schemas.openxmlformats.org/officeDocument/2006/relationships" xmlns:p="http://schemas.openxmlformats.org/presentationml/2006/main">
+  <p:cSld>
+    <p:spTree>
+      <p:nvGrpSpPr>
+        <p:cNvPr id="1" name=""/>
+        <p:cNvGrpSpPr/>
+        <p:nvPr/>
+      </p:nvGrpSpPr>
+      <p:grpSpPr>
+        <a:xfrm>
+          <a:off x="0" y="0"/>
+          <a:ext cx="0" cy="0"/>
+          <a:chOff x="0" y="0"/>
+          <a:chExt cx="0" cy="0"/>
+        </a:xfrm>
+      </p:grpSpPr>
+      <p:sp>
+        <p:nvSpPr>
+          <p:cNvPr id="2" name="Title 1"/>
+          <p:cNvSpPr>
+            <a:spLocks noGrp="1"/>
+          </p:cNvSpPr>
+          <p:nvPr>
+            <p:ph type="title"/>
+          </p:nvPr>
+        </p:nvSpPr>
+        <p:spPr/>
+        <p:txBody>
+          <a:bodyPr/>
+          <a:lstStyle/>
+          <a:p>
+            <a:r>
+              <a:rPr lang="en-US" dirty="0"/>
+              <a:t>Inter-Agent communication(contd.)</a:t>
+            </a:r>
+          </a:p>
+        </p:txBody>
+      </p:sp>
+      <p:sp>
+        <p:nvSpPr>
+          <p:cNvPr id="3" name="Content Placeholder 2"/>
+          <p:cNvSpPr>
+            <a:spLocks noGrp="1"/>
+          </p:cNvSpPr>
+          <p:nvPr>
+            <p:ph idx="1"/>
+          </p:nvPr>
+        </p:nvSpPr>
+        <p:spPr/>
+        <p:txBody>
+          <a:bodyPr/>
+          <a:lstStyle/>
+          <a:p>
+            <a:r>
+              <a:rPr lang="en-US" dirty="0"/>
+              <a:t>Appointment ➜ email Agent communication</a:t>
+            </a:r>
+          </a:p>
+        </p:txBody>
+      </p:sp>
+      <p:sp>
+        <p:nvSpPr>
+          <p:cNvPr id="4" name="Date Placeholder 3"/>
+          <p:cNvSpPr>
+            <a:spLocks noGrp="1"/>
+          </p:cNvSpPr>
+          <p:nvPr>
+            <p:ph type="dt" sz="half" idx="10"/>
+          </p:nvPr>
+        </p:nvSpPr>
+        <p:spPr/>
+        <p:txBody>
+          <a:bodyPr/>
+          <a:lstStyle/>
+          <a:p>
+            <a:r>
+              <a:rPr lang="en-US"/>
+              <a:t>SENG697 (Fall 2007)</a:t>
+            </a:r>
+            <a:endParaRPr lang="en-US" altLang="ja-JP"/>
+          </a:p>
+        </p:txBody>
+      </p:sp>
+      <p:sp>
+        <p:nvSpPr>
+          <p:cNvPr id="5" name="Footer Placeholder 4"/>
+          <p:cNvSpPr>
+            <a:spLocks noGrp="1"/>
+          </p:cNvSpPr>
+          <p:nvPr>
+            <p:ph type="ftr" sz="quarter" idx="11"/>
+          </p:nvPr>
+        </p:nvSpPr>
+        <p:spPr/>
+        <p:txBody>
+          <a:bodyPr/>
+          <a:lstStyle/>
+          <a:p>
+            <a:r>
+              <a:rPr lang="ja-JP" altLang="en-US"/>
+              <a:t>far@ucalgary.ca</a:t>
+            </a:r>
+            <a:endParaRPr lang="en-US" altLang="ja-JP"/>
+          </a:p>
+        </p:txBody>
+      </p:sp>
+      <p:sp>
+        <p:nvSpPr>
+          <p:cNvPr id="6" name="Slide Number Placeholder 5"/>
+          <p:cNvSpPr>
+            <a:spLocks noGrp="1"/>
+          </p:cNvSpPr>
+          <p:nvPr>
+            <p:ph type="sldNum" sz="quarter" idx="12"/>
+          </p:nvPr>
+        </p:nvSpPr>
+        <p:spPr/>
+        <p:txBody>
+          <a:bodyPr/>
+          <a:lstStyle/>
+          <a:p>
+            <a:fld id="{A4BAB868-1E00-44C6-B1AB-DFCC5F9865BA}" type="slidenum">
+              <a:rPr lang="ja-JP" altLang="en-US"/>
+              <a:t>52</a:t>
+            </a:fld>
+            <a:endParaRPr lang="en-US" altLang="ja-JP"/>
+          </a:p>
+        </p:txBody>
+      </p:sp>
+      <p:graphicFrame>
+        <p:nvGraphicFramePr>
+          <p:cNvPr id="7" name="Table 6"/>
+          <p:cNvGraphicFramePr/>
+          <p:nvPr>
+            <p:custDataLst>
+              <p:tags r:id="rId1"/>
+            </p:custDataLst>
+            <p:extLst>
+              <p:ext uri="{D42A27DB-BD31-4B8C-83A1-F6EECF244321}">
+                <p14:modId xmlns:p14="http://schemas.microsoft.com/office/powerpoint/2010/main" val="2116030697"/>
+              </p:ext>
+            </p:extLst>
+          </p:nvPr>
+        </p:nvGraphicFramePr>
+        <p:xfrm>
+          <a:off x="1614170" y="2175509"/>
+          <a:ext cx="9169400" cy="3793345"/>
+        </p:xfrm>
+        <a:graphic>
+          <a:graphicData uri="http://schemas.openxmlformats.org/drawingml/2006/table">
+            <a:tbl>
+              <a:tblPr firstRow="1" bandRow="1">
+                <a:tableStyleId>{5C22544A-7EE6-4342-B048-85BDC9FD1C3A}</a:tableStyleId>
+              </a:tblPr>
+              <a:tblGrid>
+                <a:gridCol w="6842125">
+                  <a:extLst>
+                    <a:ext uri="{9D8B030D-6E8A-4147-A177-3AD203B41FA5}">
+                      <a16:colId xmlns:a16="http://schemas.microsoft.com/office/drawing/2014/main" val="20000"/>
+                    </a:ext>
+                  </a:extLst>
+                </a:gridCol>
+                <a:gridCol w="2327275">
+                  <a:extLst>
+                    <a:ext uri="{9D8B030D-6E8A-4147-A177-3AD203B41FA5}">
+                      <a16:colId xmlns:a16="http://schemas.microsoft.com/office/drawing/2014/main" val="20001"/>
+                    </a:ext>
+                  </a:extLst>
+                </a:gridCol>
+              </a:tblGrid>
+              <a:tr h="511420">
+                <a:tc>
+                  <a:txBody>
+                    <a:bodyPr/>
+                    <a:lstStyle/>
+                    <a:p>
+                      <a:pPr>
+                        <a:buNone/>
+                      </a:pPr>
+                      <a:r>
+                        <a:rPr lang="en-US" sz="2400"/>
+                        <a:t>Parameters</a:t>
+                      </a:r>
+                    </a:p>
+                  </a:txBody>
+                  <a:tcPr/>
+                </a:tc>
+                <a:tc>
+                  <a:txBody>
+                    <a:bodyPr/>
+                    <a:lstStyle/>
+                    <a:p>
+                      <a:pPr>
+                        <a:buNone/>
+                      </a:pPr>
+                      <a:r>
+                        <a:rPr lang="en-US" sz="2400"/>
+                        <a:t>Description</a:t>
+                      </a:r>
+                    </a:p>
+                  </a:txBody>
+                  <a:tcPr/>
+                </a:tc>
+                <a:extLst>
+                  <a:ext uri="{0D108BD9-81ED-4DB2-BD59-A6C34878D82A}">
+                    <a16:rowId xmlns:a16="http://schemas.microsoft.com/office/drawing/2014/main" val="10000"/>
+                  </a:ext>
+                </a:extLst>
+              </a:tr>
+              <a:tr h="3281925">
+                <a:tc>
+                  <a:txBody>
+                    <a:bodyPr/>
+                    <a:lstStyle/>
+                    <a:p>
+                      <a:pPr>
+                        <a:buNone/>
+                      </a:pPr>
+                      <a:r>
+                        <a:rPr lang="en-US" sz="1600" b="0" dirty="0">
+                          <a:solidFill>
+                            <a:schemeClr val="tx1"/>
+                          </a:solidFill>
+                          <a:latin typeface="+mn-lt"/>
+                          <a:cs typeface="Times New Roman Bold" panose="02020503050405090304" charset="0"/>
+                        </a:rPr>
+                        <a:t>Sample Appointment Object :-</a:t>
+                      </a:r>
+                    </a:p>
+                    <a:p>
+                      <a:pPr>
+                        <a:buNone/>
+                      </a:pPr>
+                      <a:r>
+                        <a:rPr lang="en-US" sz="1600" b="0" dirty="0">
+                          <a:solidFill>
+                            <a:schemeClr val="tx1"/>
+                          </a:solidFill>
+                          <a:latin typeface="+mn-lt"/>
+                          <a:cs typeface="Times New Roman Bold" panose="02020503050405090304" charset="0"/>
+                        </a:rPr>
+                        <a:t>Appointment{id=85, client=Client{,FirstName=</a:t>
+                      </a:r>
+                      <a:r>
+                        <a:rPr lang="en-US" sz="1600" b="0" dirty="0" err="1">
+                          <a:solidFill>
+                            <a:schemeClr val="tx1"/>
+                          </a:solidFill>
+                          <a:latin typeface="+mn-lt"/>
+                          <a:cs typeface="Times New Roman Bold" panose="02020503050405090304" charset="0"/>
+                        </a:rPr>
+                        <a:t>Anish,LastName</a:t>
+                      </a:r>
+                      <a:r>
+                        <a:rPr lang="en-US" sz="1600" b="0" dirty="0">
+                          <a:solidFill>
+                            <a:schemeClr val="tx1"/>
+                          </a:solidFill>
+                          <a:latin typeface="+mn-lt"/>
+                          <a:cs typeface="Times New Roman Bold" panose="02020503050405090304" charset="0"/>
+                        </a:rPr>
+                        <a:t>=</a:t>
+                      </a:r>
+                      <a:r>
+                        <a:rPr lang="en-US" sz="1600" b="0" dirty="0" err="1">
+                          <a:solidFill>
+                            <a:schemeClr val="tx1"/>
+                          </a:solidFill>
+                          <a:latin typeface="+mn-lt"/>
+                          <a:cs typeface="Times New Roman Bold" panose="02020503050405090304" charset="0"/>
+                        </a:rPr>
+                        <a:t>Mukherjeeid</a:t>
+                      </a:r>
+                      <a:r>
+                        <a:rPr lang="en-US" sz="1600" b="0" dirty="0">
+                          <a:solidFill>
+                            <a:schemeClr val="tx1"/>
+                          </a:solidFill>
+                          <a:latin typeface="+mn-lt"/>
+                          <a:cs typeface="Times New Roman Bold" panose="02020503050405090304" charset="0"/>
+                        </a:rPr>
+                        <a:t>=1,phone=5875985499,email=anish09.mail@gmail.com,username=anish123,password=null'}, doctor=Doctor{id=1234567894,First Name=</a:t>
+                      </a:r>
+                      <a:r>
+                        <a:rPr lang="en-US" sz="1600" b="0" dirty="0" err="1">
+                          <a:solidFill>
+                            <a:schemeClr val="tx1"/>
+                          </a:solidFill>
+                          <a:latin typeface="+mn-lt"/>
+                          <a:cs typeface="Times New Roman Bold" panose="02020503050405090304" charset="0"/>
+                        </a:rPr>
+                        <a:t>Dr.Sam,Last</a:t>
+                      </a:r>
+                      <a:r>
+                        <a:rPr lang="en-US" sz="1600" b="0" dirty="0">
+                          <a:solidFill>
+                            <a:schemeClr val="tx1"/>
+                          </a:solidFill>
+                          <a:latin typeface="+mn-lt"/>
+                          <a:cs typeface="Times New Roman Bold" panose="02020503050405090304" charset="0"/>
+                        </a:rPr>
+                        <a:t> Name=</a:t>
+                      </a:r>
+                      <a:r>
+                        <a:rPr lang="en-US" sz="1600" b="0" dirty="0" err="1">
+                          <a:solidFill>
+                            <a:schemeClr val="tx1"/>
+                          </a:solidFill>
+                          <a:latin typeface="+mn-lt"/>
+                          <a:cs typeface="Times New Roman Bold" panose="02020503050405090304" charset="0"/>
+                        </a:rPr>
+                        <a:t>Wilkins,username</a:t>
+                      </a:r>
+                      <a:r>
+                        <a:rPr lang="en-US" sz="1600" b="0" dirty="0">
+                          <a:solidFill>
+                            <a:schemeClr val="tx1"/>
+                          </a:solidFill>
+                          <a:latin typeface="+mn-lt"/>
+                          <a:cs typeface="Times New Roman Bold" panose="02020503050405090304" charset="0"/>
+                        </a:rPr>
+                        <a:t>=</a:t>
+                      </a:r>
+                      <a:r>
+                        <a:rPr lang="en-US" sz="1600" b="0" dirty="0" err="1">
+                          <a:solidFill>
+                            <a:schemeClr val="tx1"/>
+                          </a:solidFill>
+                          <a:latin typeface="+mn-lt"/>
+                          <a:cs typeface="Times New Roman Bold" panose="02020503050405090304" charset="0"/>
+                        </a:rPr>
+                        <a:t>doctorD,phone</a:t>
+                      </a:r>
+                      <a:r>
+                        <a:rPr lang="en-US" sz="1600" b="0" dirty="0">
+                          <a:solidFill>
+                            <a:schemeClr val="tx1"/>
+                          </a:solidFill>
+                          <a:latin typeface="+mn-lt"/>
+                          <a:cs typeface="Times New Roman Bold" panose="02020503050405090304" charset="0"/>
+                        </a:rPr>
+                        <a:t>=1234567883,</a:t>
+                      </a:r>
+                    </a:p>
+                    <a:p>
+                      <a:pPr>
+                        <a:buNone/>
+                      </a:pPr>
+                      <a:r>
+                        <a:rPr lang="en-US" sz="1600" b="0" dirty="0">
+                          <a:solidFill>
+                            <a:schemeClr val="tx1"/>
+                          </a:solidFill>
+                          <a:latin typeface="+mn-lt"/>
+                          <a:cs typeface="Times New Roman Bold" panose="02020503050405090304" charset="0"/>
+                        </a:rPr>
+                        <a:t>email=talk2anish@gmail.com,specialty=null’}, </a:t>
+                      </a:r>
+                    </a:p>
+                    <a:p>
+                      <a:pPr>
+                        <a:buNone/>
+                      </a:pPr>
+                      <a:r>
+                        <a:rPr lang="en-US" sz="1600" b="0" dirty="0" err="1">
+                          <a:solidFill>
+                            <a:schemeClr val="tx1"/>
+                          </a:solidFill>
+                          <a:latin typeface="+mn-lt"/>
+                          <a:cs typeface="Times New Roman Bold" panose="02020503050405090304" charset="0"/>
+                        </a:rPr>
+                        <a:t>dateTime</a:t>
+                      </a:r>
+                      <a:r>
+                        <a:rPr lang="en-US" sz="1600" b="0" dirty="0">
+                          <a:solidFill>
+                            <a:schemeClr val="tx1"/>
+                          </a:solidFill>
+                          <a:latin typeface="+mn-lt"/>
+                          <a:cs typeface="Times New Roman Bold" panose="02020503050405090304" charset="0"/>
+                        </a:rPr>
+                        <a:t>=2021-12-10 09:00:00.0, </a:t>
+                      </a:r>
+                    </a:p>
+                    <a:p>
+                      <a:pPr>
+                        <a:buNone/>
+                      </a:pPr>
+                      <a:r>
+                        <a:rPr lang="en-US" sz="1600" b="0" dirty="0">
+                          <a:solidFill>
+                            <a:schemeClr val="tx1"/>
+                          </a:solidFill>
+                          <a:latin typeface="+mn-lt"/>
+                          <a:cs typeface="Times New Roman Bold" panose="02020503050405090304" charset="0"/>
+                        </a:rPr>
+                        <a:t>description='The Dog is ill', notes='', criticality=1, </a:t>
+                      </a:r>
+                    </a:p>
+                    <a:p>
+                      <a:pPr>
+                        <a:buNone/>
+                      </a:pPr>
+                      <a:r>
+                        <a:rPr lang="en-US" sz="1600" b="0" dirty="0">
+                          <a:solidFill>
+                            <a:schemeClr val="tx1"/>
+                          </a:solidFill>
+                          <a:latin typeface="+mn-lt"/>
+                          <a:cs typeface="Times New Roman Bold" panose="02020503050405090304" charset="0"/>
+                        </a:rPr>
+                        <a:t>status='Scheduled', email='yes’, </a:t>
+                      </a:r>
+                    </a:p>
+                    <a:p>
+                      <a:pPr>
+                        <a:buNone/>
+                      </a:pPr>
+                      <a:r>
+                        <a:rPr lang="en-US" sz="1600" b="0" dirty="0" err="1">
+                          <a:solidFill>
+                            <a:schemeClr val="tx1"/>
+                          </a:solidFill>
+                          <a:latin typeface="+mn-lt"/>
+                          <a:cs typeface="Times New Roman Bold" panose="02020503050405090304" charset="0"/>
+                        </a:rPr>
+                        <a:t>sms</a:t>
+                      </a:r>
+                      <a:r>
+                        <a:rPr lang="en-US" sz="1600" b="0" dirty="0">
+                          <a:solidFill>
+                            <a:schemeClr val="tx1"/>
+                          </a:solidFill>
+                          <a:latin typeface="+mn-lt"/>
+                          <a:cs typeface="Times New Roman Bold" panose="02020503050405090304" charset="0"/>
+                        </a:rPr>
+                        <a:t>='null', feedback='null', age='5’,</a:t>
+                      </a:r>
+                    </a:p>
+                    <a:p>
+                      <a:pPr>
+                        <a:buNone/>
+                      </a:pPr>
+                      <a:r>
+                        <a:rPr lang="en-US" sz="1600" b="0" dirty="0">
+                          <a:solidFill>
+                            <a:schemeClr val="tx1"/>
+                          </a:solidFill>
+                          <a:latin typeface="+mn-lt"/>
+                          <a:cs typeface="Times New Roman Bold" panose="02020503050405090304" charset="0"/>
+                        </a:rPr>
+                        <a:t> breed='</a:t>
+                      </a:r>
+                      <a:r>
+                        <a:rPr lang="en-US" sz="1600" b="0" dirty="0" err="1">
+                          <a:solidFill>
+                            <a:schemeClr val="tx1"/>
+                          </a:solidFill>
+                          <a:latin typeface="+mn-lt"/>
+                          <a:cs typeface="Times New Roman Bold" panose="02020503050405090304" charset="0"/>
+                        </a:rPr>
+                        <a:t>Pomerenian</a:t>
+                      </a:r>
+                      <a:r>
+                        <a:rPr lang="en-US" sz="1600" b="0" dirty="0">
+                          <a:solidFill>
+                            <a:schemeClr val="tx1"/>
+                          </a:solidFill>
+                          <a:latin typeface="+mn-lt"/>
+                          <a:cs typeface="Times New Roman Bold" panose="02020503050405090304" charset="0"/>
+                        </a:rPr>
+                        <a:t>'}</a:t>
+                      </a:r>
+                    </a:p>
+                  </a:txBody>
+                  <a:tcPr/>
+                </a:tc>
+                <a:tc>
+                  <a:txBody>
+                    <a:bodyPr/>
+                    <a:lstStyle/>
+                    <a:p>
+                      <a:pPr>
+                        <a:buNone/>
+                      </a:pPr>
+                      <a:r>
+                        <a:rPr lang="en-US" sz="1600" dirty="0"/>
+                        <a:t>Appointment details such as we book appointment of doctor. Username, Password, phone of doctor.</a:t>
+                      </a:r>
+                    </a:p>
+                  </a:txBody>
+                  <a:tcPr/>
+                </a:tc>
+                <a:extLst>
+                  <a:ext uri="{0D108BD9-81ED-4DB2-BD59-A6C34878D82A}">
+                    <a16:rowId xmlns:a16="http://schemas.microsoft.com/office/drawing/2014/main" val="10001"/>
+                  </a:ext>
+                </a:extLst>
+              </a:tr>
+            </a:tbl>
+          </a:graphicData>
+        </a:graphic>
+      </p:graphicFrame>
+    </p:spTree>
+    <p:extLst>
+      <p:ext uri="{BB962C8B-B14F-4D97-AF65-F5344CB8AC3E}">
+        <p14:creationId xmlns:p14="http://schemas.microsoft.com/office/powerpoint/2010/main" val="849537188"/>
+      </p:ext>
+    </p:extLst>
   </p:cSld>
   <p:clrMapOvr>
     <a:masterClrMapping/>
@@ -40633,6 +42987,24 @@
 </p:tagLst>
 </file>
 
+<file path=ppt/tags/tag4.xml><?xml version="1.0" encoding="utf-8"?>
+<p:tagLst xmlns:a="http://schemas.openxmlformats.org/drawingml/2006/main" xmlns:r="http://schemas.openxmlformats.org/officeDocument/2006/relationships" xmlns:p="http://schemas.openxmlformats.org/presentationml/2006/main">
+  <p:tag name="KSO_WM_UNIT_TABLE_BEAUTIFY" val="smartTable{663554d3-cd4b-4c2e-86e1-6d6dbbf29a51}"/>
+</p:tagLst>
+</file>
+
+<file path=ppt/tags/tag5.xml><?xml version="1.0" encoding="utf-8"?>
+<p:tagLst xmlns:a="http://schemas.openxmlformats.org/drawingml/2006/main" xmlns:r="http://schemas.openxmlformats.org/officeDocument/2006/relationships" xmlns:p="http://schemas.openxmlformats.org/presentationml/2006/main">
+  <p:tag name="KSO_WM_UNIT_TABLE_BEAUTIFY" val="smartTable{663554d3-cd4b-4c2e-86e1-6d6dbbf29a51}"/>
+</p:tagLst>
+</file>
+
+<file path=ppt/tags/tag6.xml><?xml version="1.0" encoding="utf-8"?>
+<p:tagLst xmlns:a="http://schemas.openxmlformats.org/drawingml/2006/main" xmlns:r="http://schemas.openxmlformats.org/officeDocument/2006/relationships" xmlns:p="http://schemas.openxmlformats.org/presentationml/2006/main">
+  <p:tag name="KSO_WM_UNIT_TABLE_BEAUTIFY" val="smartTable{663554d3-cd4b-4c2e-86e1-6d6dbbf29a51}"/>
+</p:tagLst>
+</file>
+
 <file path=ppt/theme/theme1.xml><?xml version="1.0" encoding="utf-8"?>
 <a:theme xmlns:a="http://schemas.openxmlformats.org/drawingml/2006/main" name="UofC_template">
   <a:themeElements>

</xml_diff>